<commit_message>
need to adjust pcts. active_minus done
</commit_message>
<xml_diff>
--- a/data/basketballProject/reference-files/publishing-presentation.pptx
+++ b/data/basketballProject/reference-files/publishing-presentation.pptx
@@ -108,17 +108,20 @@
   <p:extLst>
     <p:ext uri="{521415D9-36F7-43E2-AB2F-B90AF26B5E84}">
       <p14:sectionLst xmlns:p14="http://schemas.microsoft.com/office/powerpoint/2010/main">
-        <p14:section name="Active" id="{ED650B86-86B8-40B0-8B2A-FB37527CB17B}">
+        <p14:section name="Points Active" id="{ED650B86-86B8-40B0-8B2A-FB37527CB17B}">
           <p14:sldIdLst>
             <p14:sldId id="256"/>
           </p14:sldIdLst>
         </p14:section>
-        <p14:section name="Historical" id="{61D62F15-0704-4E43-858F-4186B67E0049}">
+        <p14:section name="Points Historical" id="{61D62F15-0704-4E43-858F-4186B67E0049}">
           <p14:sldIdLst>
             <p14:sldId id="257"/>
           </p14:sldIdLst>
         </p14:section>
       </p14:sectionLst>
+    </p:ext>
+    <p:ext uri="{EFAFB233-063F-42B5-8137-9DF3F51BA10A}">
+      <p15:sldGuideLst xmlns:p15="http://schemas.microsoft.com/office/powerpoint/2012/main"/>
     </p:ext>
   </p:extLst>
 </p:presentation>
@@ -3379,10 +3382,10 @@
       </p:cxnSp>
       <p:grpSp>
         <p:nvGrpSpPr>
-          <p:cNvPr id="44" name="Group 43">
-            <a:extLst>
-              <a:ext uri="{FF2B5EF4-FFF2-40B4-BE49-F238E27FC236}">
-                <a16:creationId xmlns:a16="http://schemas.microsoft.com/office/drawing/2014/main" id="{3AEE3BFB-141B-8E90-0AC3-64AE1F986542}"/>
+          <p:cNvPr id="8" name="Group 7">
+            <a:extLst>
+              <a:ext uri="{FF2B5EF4-FFF2-40B4-BE49-F238E27FC236}">
+                <a16:creationId xmlns:a16="http://schemas.microsoft.com/office/drawing/2014/main" id="{28C8A35E-31E2-67D9-52B8-12BCA9F70156}"/>
               </a:ext>
             </a:extLst>
           </p:cNvPr>
@@ -3391,18 +3394,18 @@
         </p:nvGrpSpPr>
         <p:grpSpPr>
           <a:xfrm>
-            <a:off x="83820" y="219843"/>
-            <a:ext cx="12024360" cy="3251814"/>
-            <a:chOff x="83820" y="219843"/>
-            <a:chExt cx="12024360" cy="3251814"/>
+            <a:off x="91844" y="3590873"/>
+            <a:ext cx="12024360" cy="3166090"/>
+            <a:chOff x="91844" y="3590873"/>
+            <a:chExt cx="12024360" cy="3166090"/>
           </a:xfrm>
         </p:grpSpPr>
         <p:pic>
           <p:nvPicPr>
-            <p:cNvPr id="39" name="Picture 38">
+            <p:cNvPr id="3" name="Picture 2">
               <a:extLst>
                 <a:ext uri="{FF2B5EF4-FFF2-40B4-BE49-F238E27FC236}">
-                  <a16:creationId xmlns:a16="http://schemas.microsoft.com/office/drawing/2014/main" id="{27A9BBDB-4C0D-0117-2C89-13155F9B91E4}"/>
+                  <a16:creationId xmlns:a16="http://schemas.microsoft.com/office/drawing/2014/main" id="{828BB990-E95F-B195-9FE1-FA795B956D28}"/>
                 </a:ext>
               </a:extLst>
             </p:cNvPr>
@@ -3419,8 +3422,8 @@
           </p:blipFill>
           <p:spPr>
             <a:xfrm>
-              <a:off x="8148828" y="219843"/>
-              <a:ext cx="3959352" cy="3251814"/>
+              <a:off x="8156852" y="3590873"/>
+              <a:ext cx="3959352" cy="3166090"/>
             </a:xfrm>
             <a:prstGeom prst="rect">
               <a:avLst/>
@@ -3434,10 +3437,10 @@
         </p:pic>
         <p:pic>
           <p:nvPicPr>
-            <p:cNvPr id="41" name="Picture 40">
+            <p:cNvPr id="5" name="Picture 4">
               <a:extLst>
                 <a:ext uri="{FF2B5EF4-FFF2-40B4-BE49-F238E27FC236}">
-                  <a16:creationId xmlns:a16="http://schemas.microsoft.com/office/drawing/2014/main" id="{A37B5A6E-7DB7-5BB8-1CF3-F641BED1F888}"/>
+                  <a16:creationId xmlns:a16="http://schemas.microsoft.com/office/drawing/2014/main" id="{4469171E-E39A-CD04-F3E8-B7997966C80D}"/>
                 </a:ext>
               </a:extLst>
             </p:cNvPr>
@@ -3454,8 +3457,8 @@
           </p:blipFill>
           <p:spPr>
             <a:xfrm>
-              <a:off x="4116324" y="219843"/>
-              <a:ext cx="3959352" cy="3251814"/>
+              <a:off x="4124348" y="3590873"/>
+              <a:ext cx="3959352" cy="3166090"/>
             </a:xfrm>
             <a:prstGeom prst="rect">
               <a:avLst/>
@@ -3469,10 +3472,10 @@
         </p:pic>
         <p:pic>
           <p:nvPicPr>
-            <p:cNvPr id="43" name="Picture 42">
+            <p:cNvPr id="7" name="Picture 6">
               <a:extLst>
                 <a:ext uri="{FF2B5EF4-FFF2-40B4-BE49-F238E27FC236}">
-                  <a16:creationId xmlns:a16="http://schemas.microsoft.com/office/drawing/2014/main" id="{AD824798-87E2-BA92-9506-AF139F1DE52C}"/>
+                  <a16:creationId xmlns:a16="http://schemas.microsoft.com/office/drawing/2014/main" id="{A8D9E011-49F9-05DC-864C-B5F82B063A62}"/>
                 </a:ext>
               </a:extLst>
             </p:cNvPr>
@@ -3489,8 +3492,8 @@
           </p:blipFill>
           <p:spPr>
             <a:xfrm>
-              <a:off x="83820" y="219843"/>
-              <a:ext cx="3959352" cy="3251814"/>
+              <a:off x="91844" y="3590873"/>
+              <a:ext cx="3959352" cy="3166090"/>
             </a:xfrm>
             <a:prstGeom prst="rect">
               <a:avLst/>
@@ -3505,10 +3508,10 @@
       </p:grpSp>
       <p:grpSp>
         <p:nvGrpSpPr>
-          <p:cNvPr id="51" name="Group 50">
-            <a:extLst>
-              <a:ext uri="{FF2B5EF4-FFF2-40B4-BE49-F238E27FC236}">
-                <a16:creationId xmlns:a16="http://schemas.microsoft.com/office/drawing/2014/main" id="{8798633D-13D9-0E25-6421-6F618F14F265}"/>
+          <p:cNvPr id="16" name="Group 15">
+            <a:extLst>
+              <a:ext uri="{FF2B5EF4-FFF2-40B4-BE49-F238E27FC236}">
+                <a16:creationId xmlns:a16="http://schemas.microsoft.com/office/drawing/2014/main" id="{1E9B83CD-0288-4318-D565-F58B4358DC21}"/>
               </a:ext>
             </a:extLst>
           </p:cNvPr>
@@ -3517,18 +3520,18 @@
         </p:nvGrpSpPr>
         <p:grpSpPr>
           <a:xfrm>
-            <a:off x="83820" y="3554259"/>
-            <a:ext cx="12024360" cy="3166090"/>
-            <a:chOff x="83820" y="2386472"/>
-            <a:chExt cx="12024360" cy="3166090"/>
+            <a:off x="91844" y="238355"/>
+            <a:ext cx="12024360" cy="3251814"/>
+            <a:chOff x="91844" y="238355"/>
+            <a:chExt cx="12024360" cy="3251814"/>
           </a:xfrm>
         </p:grpSpPr>
         <p:pic>
           <p:nvPicPr>
-            <p:cNvPr id="46" name="Picture 45">
+            <p:cNvPr id="10" name="Picture 9">
               <a:extLst>
                 <a:ext uri="{FF2B5EF4-FFF2-40B4-BE49-F238E27FC236}">
-                  <a16:creationId xmlns:a16="http://schemas.microsoft.com/office/drawing/2014/main" id="{434727CF-2EF4-AF80-671E-0D34356562DF}"/>
+                  <a16:creationId xmlns:a16="http://schemas.microsoft.com/office/drawing/2014/main" id="{10A5D44C-9A9D-77EB-DDBD-B2B105C5CD99}"/>
                 </a:ext>
               </a:extLst>
             </p:cNvPr>
@@ -3545,8 +3548,8 @@
           </p:blipFill>
           <p:spPr>
             <a:xfrm>
-              <a:off x="8148828" y="2386472"/>
-              <a:ext cx="3959352" cy="3166090"/>
+              <a:off x="8156852" y="238355"/>
+              <a:ext cx="3959352" cy="3251814"/>
             </a:xfrm>
             <a:prstGeom prst="rect">
               <a:avLst/>
@@ -3560,10 +3563,10 @@
         </p:pic>
         <p:pic>
           <p:nvPicPr>
-            <p:cNvPr id="48" name="Picture 47">
+            <p:cNvPr id="12" name="Picture 11">
               <a:extLst>
                 <a:ext uri="{FF2B5EF4-FFF2-40B4-BE49-F238E27FC236}">
-                  <a16:creationId xmlns:a16="http://schemas.microsoft.com/office/drawing/2014/main" id="{AC770FB1-4DD5-CC15-218A-11DBC848E0F2}"/>
+                  <a16:creationId xmlns:a16="http://schemas.microsoft.com/office/drawing/2014/main" id="{A10263BA-1E5A-2C57-85BA-71F9CB0E31E6}"/>
                 </a:ext>
               </a:extLst>
             </p:cNvPr>
@@ -3580,8 +3583,8 @@
           </p:blipFill>
           <p:spPr>
             <a:xfrm>
-              <a:off x="4116324" y="2386472"/>
-              <a:ext cx="3959352" cy="3166090"/>
+              <a:off x="4124348" y="238355"/>
+              <a:ext cx="3959352" cy="3251814"/>
             </a:xfrm>
             <a:prstGeom prst="rect">
               <a:avLst/>
@@ -3595,10 +3598,10 @@
         </p:pic>
         <p:pic>
           <p:nvPicPr>
-            <p:cNvPr id="50" name="Picture 49">
+            <p:cNvPr id="14" name="Picture 13">
               <a:extLst>
                 <a:ext uri="{FF2B5EF4-FFF2-40B4-BE49-F238E27FC236}">
-                  <a16:creationId xmlns:a16="http://schemas.microsoft.com/office/drawing/2014/main" id="{757C3C8B-C526-143E-D8F2-307BC9A78C9F}"/>
+                  <a16:creationId xmlns:a16="http://schemas.microsoft.com/office/drawing/2014/main" id="{BCEE470F-3F59-20E2-BD93-DDCA3626ED7A}"/>
                 </a:ext>
               </a:extLst>
             </p:cNvPr>
@@ -3615,8 +3618,8 @@
           </p:blipFill>
           <p:spPr>
             <a:xfrm>
-              <a:off x="83820" y="2386472"/>
-              <a:ext cx="3959352" cy="3166090"/>
+              <a:off x="91844" y="238355"/>
+              <a:ext cx="3959352" cy="3251814"/>
             </a:xfrm>
             <a:prstGeom prst="rect">
               <a:avLst/>
@@ -3659,132 +3662,6 @@
           <a:chExt cx="0" cy="0"/>
         </a:xfrm>
       </p:grpSpPr>
-      <p:grpSp>
-        <p:nvGrpSpPr>
-          <p:cNvPr id="33" name="Group 32">
-            <a:extLst>
-              <a:ext uri="{FF2B5EF4-FFF2-40B4-BE49-F238E27FC236}">
-                <a16:creationId xmlns:a16="http://schemas.microsoft.com/office/drawing/2014/main" id="{CA3E4B76-2155-D7C5-34D1-9DFEDB547963}"/>
-              </a:ext>
-            </a:extLst>
-          </p:cNvPr>
-          <p:cNvGrpSpPr/>
-          <p:nvPr/>
-        </p:nvGrpSpPr>
-        <p:grpSpPr>
-          <a:xfrm>
-            <a:off x="83820" y="258063"/>
-            <a:ext cx="12024360" cy="3251814"/>
-            <a:chOff x="83820" y="288668"/>
-            <a:chExt cx="12024360" cy="3251814"/>
-          </a:xfrm>
-        </p:grpSpPr>
-        <p:pic>
-          <p:nvPicPr>
-            <p:cNvPr id="10" name="Picture 9">
-              <a:extLst>
-                <a:ext uri="{FF2B5EF4-FFF2-40B4-BE49-F238E27FC236}">
-                  <a16:creationId xmlns:a16="http://schemas.microsoft.com/office/drawing/2014/main" id="{BB55872D-3D11-D937-41DB-CCF46B316C62}"/>
-                </a:ext>
-              </a:extLst>
-            </p:cNvPr>
-            <p:cNvPicPr>
-              <a:picLocks noChangeAspect="1"/>
-            </p:cNvPicPr>
-            <p:nvPr/>
-          </p:nvPicPr>
-          <p:blipFill>
-            <a:blip r:embed="rId2"/>
-            <a:stretch>
-              <a:fillRect/>
-            </a:stretch>
-          </p:blipFill>
-          <p:spPr>
-            <a:xfrm>
-              <a:off x="8148828" y="288668"/>
-              <a:ext cx="3959352" cy="3251814"/>
-            </a:xfrm>
-            <a:prstGeom prst="rect">
-              <a:avLst/>
-            </a:prstGeom>
-            <a:ln>
-              <a:solidFill>
-                <a:schemeClr val="tx1"/>
-              </a:solidFill>
-            </a:ln>
-          </p:spPr>
-        </p:pic>
-        <p:pic>
-          <p:nvPicPr>
-            <p:cNvPr id="12" name="Picture 11">
-              <a:extLst>
-                <a:ext uri="{FF2B5EF4-FFF2-40B4-BE49-F238E27FC236}">
-                  <a16:creationId xmlns:a16="http://schemas.microsoft.com/office/drawing/2014/main" id="{43A0FB4A-C708-4286-2424-C3C44D65FA04}"/>
-                </a:ext>
-              </a:extLst>
-            </p:cNvPr>
-            <p:cNvPicPr>
-              <a:picLocks noChangeAspect="1"/>
-            </p:cNvPicPr>
-            <p:nvPr/>
-          </p:nvPicPr>
-          <p:blipFill>
-            <a:blip r:embed="rId3"/>
-            <a:stretch>
-              <a:fillRect/>
-            </a:stretch>
-          </p:blipFill>
-          <p:spPr>
-            <a:xfrm>
-              <a:off x="4116324" y="288668"/>
-              <a:ext cx="3959352" cy="3251814"/>
-            </a:xfrm>
-            <a:prstGeom prst="rect">
-              <a:avLst/>
-            </a:prstGeom>
-            <a:ln>
-              <a:solidFill>
-                <a:schemeClr val="tx1"/>
-              </a:solidFill>
-            </a:ln>
-          </p:spPr>
-        </p:pic>
-        <p:pic>
-          <p:nvPicPr>
-            <p:cNvPr id="14" name="Picture 13">
-              <a:extLst>
-                <a:ext uri="{FF2B5EF4-FFF2-40B4-BE49-F238E27FC236}">
-                  <a16:creationId xmlns:a16="http://schemas.microsoft.com/office/drawing/2014/main" id="{CB306A6E-1164-1567-7DF6-23B79E2CA3A2}"/>
-                </a:ext>
-              </a:extLst>
-            </p:cNvPr>
-            <p:cNvPicPr>
-              <a:picLocks noChangeAspect="1"/>
-            </p:cNvPicPr>
-            <p:nvPr/>
-          </p:nvPicPr>
-          <p:blipFill>
-            <a:blip r:embed="rId4"/>
-            <a:stretch>
-              <a:fillRect/>
-            </a:stretch>
-          </p:blipFill>
-          <p:spPr>
-            <a:xfrm>
-              <a:off x="83820" y="288668"/>
-              <a:ext cx="3959352" cy="3251814"/>
-            </a:xfrm>
-            <a:prstGeom prst="rect">
-              <a:avLst/>
-            </a:prstGeom>
-            <a:ln>
-              <a:solidFill>
-                <a:schemeClr val="tx1"/>
-              </a:solidFill>
-            </a:ln>
-          </p:spPr>
-        </p:pic>
-      </p:grpSp>
       <p:cxnSp>
         <p:nvCxnSpPr>
           <p:cNvPr id="16" name="Straight Connector 15">
@@ -3826,10 +3703,10 @@
       </p:cxnSp>
       <p:grpSp>
         <p:nvGrpSpPr>
-          <p:cNvPr id="30" name="Group 29">
-            <a:extLst>
-              <a:ext uri="{FF2B5EF4-FFF2-40B4-BE49-F238E27FC236}">
-                <a16:creationId xmlns:a16="http://schemas.microsoft.com/office/drawing/2014/main" id="{F396F1B1-B823-D35B-2AC6-C393636C1D02}"/>
+          <p:cNvPr id="8" name="Group 7">
+            <a:extLst>
+              <a:ext uri="{FF2B5EF4-FFF2-40B4-BE49-F238E27FC236}">
+                <a16:creationId xmlns:a16="http://schemas.microsoft.com/office/drawing/2014/main" id="{EC6A455C-B2BB-21B1-9378-DCA356CA70A1}"/>
               </a:ext>
             </a:extLst>
           </p:cNvPr>
@@ -3838,18 +3715,144 @@
         </p:nvGrpSpPr>
         <p:grpSpPr>
           <a:xfrm>
-            <a:off x="83820" y="3630289"/>
+            <a:off x="83820" y="225851"/>
+            <a:ext cx="12024360" cy="3251814"/>
+            <a:chOff x="83820" y="225851"/>
+            <a:chExt cx="12024360" cy="3251814"/>
+          </a:xfrm>
+        </p:grpSpPr>
+        <p:pic>
+          <p:nvPicPr>
+            <p:cNvPr id="3" name="Picture 2">
+              <a:extLst>
+                <a:ext uri="{FF2B5EF4-FFF2-40B4-BE49-F238E27FC236}">
+                  <a16:creationId xmlns:a16="http://schemas.microsoft.com/office/drawing/2014/main" id="{C7D7046F-FCA0-38A0-8914-D8E5DBA53E57}"/>
+                </a:ext>
+              </a:extLst>
+            </p:cNvPr>
+            <p:cNvPicPr>
+              <a:picLocks noChangeAspect="1"/>
+            </p:cNvPicPr>
+            <p:nvPr/>
+          </p:nvPicPr>
+          <p:blipFill>
+            <a:blip r:embed="rId2"/>
+            <a:stretch>
+              <a:fillRect/>
+            </a:stretch>
+          </p:blipFill>
+          <p:spPr>
+            <a:xfrm>
+              <a:off x="8148828" y="225851"/>
+              <a:ext cx="3959352" cy="3251814"/>
+            </a:xfrm>
+            <a:prstGeom prst="rect">
+              <a:avLst/>
+            </a:prstGeom>
+            <a:ln>
+              <a:solidFill>
+                <a:schemeClr val="tx1"/>
+              </a:solidFill>
+            </a:ln>
+          </p:spPr>
+        </p:pic>
+        <p:pic>
+          <p:nvPicPr>
+            <p:cNvPr id="5" name="Picture 4">
+              <a:extLst>
+                <a:ext uri="{FF2B5EF4-FFF2-40B4-BE49-F238E27FC236}">
+                  <a16:creationId xmlns:a16="http://schemas.microsoft.com/office/drawing/2014/main" id="{BCDE13D9-32C3-5533-FD21-FF464EFC7FEB}"/>
+                </a:ext>
+              </a:extLst>
+            </p:cNvPr>
+            <p:cNvPicPr>
+              <a:picLocks noChangeAspect="1"/>
+            </p:cNvPicPr>
+            <p:nvPr/>
+          </p:nvPicPr>
+          <p:blipFill>
+            <a:blip r:embed="rId3"/>
+            <a:stretch>
+              <a:fillRect/>
+            </a:stretch>
+          </p:blipFill>
+          <p:spPr>
+            <a:xfrm>
+              <a:off x="4116324" y="225851"/>
+              <a:ext cx="3959352" cy="3251814"/>
+            </a:xfrm>
+            <a:prstGeom prst="rect">
+              <a:avLst/>
+            </a:prstGeom>
+            <a:ln>
+              <a:solidFill>
+                <a:schemeClr val="tx1"/>
+              </a:solidFill>
+            </a:ln>
+          </p:spPr>
+        </p:pic>
+        <p:pic>
+          <p:nvPicPr>
+            <p:cNvPr id="7" name="Picture 6">
+              <a:extLst>
+                <a:ext uri="{FF2B5EF4-FFF2-40B4-BE49-F238E27FC236}">
+                  <a16:creationId xmlns:a16="http://schemas.microsoft.com/office/drawing/2014/main" id="{149DFAC2-9DF3-A3D7-56B2-174E463C9D92}"/>
+                </a:ext>
+              </a:extLst>
+            </p:cNvPr>
+            <p:cNvPicPr>
+              <a:picLocks noChangeAspect="1"/>
+            </p:cNvPicPr>
+            <p:nvPr/>
+          </p:nvPicPr>
+          <p:blipFill>
+            <a:blip r:embed="rId4"/>
+            <a:stretch>
+              <a:fillRect/>
+            </a:stretch>
+          </p:blipFill>
+          <p:spPr>
+            <a:xfrm>
+              <a:off x="83820" y="225851"/>
+              <a:ext cx="3959352" cy="3251814"/>
+            </a:xfrm>
+            <a:prstGeom prst="rect">
+              <a:avLst/>
+            </a:prstGeom>
+            <a:ln>
+              <a:solidFill>
+                <a:schemeClr val="tx1"/>
+              </a:solidFill>
+            </a:ln>
+          </p:spPr>
+        </p:pic>
+      </p:grpSp>
+      <p:grpSp>
+        <p:nvGrpSpPr>
+          <p:cNvPr id="20" name="Group 19">
+            <a:extLst>
+              <a:ext uri="{FF2B5EF4-FFF2-40B4-BE49-F238E27FC236}">
+                <a16:creationId xmlns:a16="http://schemas.microsoft.com/office/drawing/2014/main" id="{05FB0676-B37E-E2A3-B24C-2D1DDB395A1B}"/>
+              </a:ext>
+            </a:extLst>
+          </p:cNvPr>
+          <p:cNvGrpSpPr/>
+          <p:nvPr/>
+        </p:nvGrpSpPr>
+        <p:grpSpPr>
+          <a:xfrm>
+            <a:off x="83820" y="3552177"/>
             <a:ext cx="12024360" cy="3090060"/>
-            <a:chOff x="83820" y="3630289"/>
+            <a:chOff x="83820" y="3552177"/>
             <a:chExt cx="12024360" cy="3090060"/>
           </a:xfrm>
         </p:grpSpPr>
         <p:pic>
           <p:nvPicPr>
-            <p:cNvPr id="19" name="Picture 18">
+            <p:cNvPr id="11" name="Picture 10">
               <a:extLst>
                 <a:ext uri="{FF2B5EF4-FFF2-40B4-BE49-F238E27FC236}">
-                  <a16:creationId xmlns:a16="http://schemas.microsoft.com/office/drawing/2014/main" id="{6D959091-D151-F233-F07F-713F28A36AC0}"/>
+                  <a16:creationId xmlns:a16="http://schemas.microsoft.com/office/drawing/2014/main" id="{1F90E070-C7E7-5710-CE66-3DBCB2B7E795}"/>
                 </a:ext>
               </a:extLst>
             </p:cNvPr>
@@ -3866,7 +3869,7 @@
           </p:blipFill>
           <p:spPr>
             <a:xfrm>
-              <a:off x="8148828" y="3630289"/>
+              <a:off x="8148828" y="3552177"/>
               <a:ext cx="3959352" cy="3090060"/>
             </a:xfrm>
             <a:prstGeom prst="rect">
@@ -3881,10 +3884,10 @@
         </p:pic>
         <p:pic>
           <p:nvPicPr>
-            <p:cNvPr id="23" name="Picture 22">
+            <p:cNvPr id="15" name="Picture 14">
               <a:extLst>
                 <a:ext uri="{FF2B5EF4-FFF2-40B4-BE49-F238E27FC236}">
-                  <a16:creationId xmlns:a16="http://schemas.microsoft.com/office/drawing/2014/main" id="{935AE614-6420-1628-808F-63B385C2C8CE}"/>
+                  <a16:creationId xmlns:a16="http://schemas.microsoft.com/office/drawing/2014/main" id="{6906BC2B-EFAF-F507-4567-510B892DA62F}"/>
                 </a:ext>
               </a:extLst>
             </p:cNvPr>
@@ -3901,7 +3904,7 @@
           </p:blipFill>
           <p:spPr>
             <a:xfrm>
-              <a:off x="4116324" y="3630289"/>
+              <a:off x="4116324" y="3552177"/>
               <a:ext cx="3959352" cy="3090060"/>
             </a:xfrm>
             <a:prstGeom prst="rect">
@@ -3916,10 +3919,10 @@
         </p:pic>
         <p:pic>
           <p:nvPicPr>
-            <p:cNvPr id="26" name="Picture 25">
+            <p:cNvPr id="18" name="Picture 17">
               <a:extLst>
                 <a:ext uri="{FF2B5EF4-FFF2-40B4-BE49-F238E27FC236}">
-                  <a16:creationId xmlns:a16="http://schemas.microsoft.com/office/drawing/2014/main" id="{D7C35061-A3D8-9317-CB78-D39AA6D44C92}"/>
+                  <a16:creationId xmlns:a16="http://schemas.microsoft.com/office/drawing/2014/main" id="{6ED81753-9205-2D14-5F50-C5BBF3FCA758}"/>
                 </a:ext>
               </a:extLst>
             </p:cNvPr>
@@ -3936,7 +3939,7 @@
           </p:blipFill>
           <p:spPr>
             <a:xfrm>
-              <a:off x="83820" y="3630289"/>
+              <a:off x="83820" y="3552177"/>
               <a:ext cx="3959352" cy="3090060"/>
             </a:xfrm>
             <a:prstGeom prst="rect">

</xml_diff>

<commit_message>
3pt shooting and fixes from writing (#62)
* fixes from writing

* need to adjust pcts. active_minus done

* fixes #61;

* closes #61
</commit_message>
<xml_diff>
--- a/data/basketballProject/reference-files/publishing-presentation.pptx
+++ b/data/basketballProject/reference-files/publishing-presentation.pptx
@@ -7,6 +7,8 @@
   <p:sldIdLst>
     <p:sldId id="256" r:id="rId2"/>
     <p:sldId id="257" r:id="rId3"/>
+    <p:sldId id="258" r:id="rId4"/>
+    <p:sldId id="259" r:id="rId5"/>
   </p:sldIdLst>
   <p:sldSz cx="12192000" cy="6858000"/>
   <p:notesSz cx="6858000" cy="9144000"/>
@@ -108,17 +110,30 @@
   <p:extLst>
     <p:ext uri="{521415D9-36F7-43E2-AB2F-B90AF26B5E84}">
       <p14:sectionLst xmlns:p14="http://schemas.microsoft.com/office/powerpoint/2010/main">
-        <p14:section name="Active" id="{ED650B86-86B8-40B0-8B2A-FB37527CB17B}">
+        <p14:section name="Points Active" id="{ED650B86-86B8-40B0-8B2A-FB37527CB17B}">
           <p14:sldIdLst>
             <p14:sldId id="256"/>
           </p14:sldIdLst>
         </p14:section>
-        <p14:section name="Historical" id="{61D62F15-0704-4E43-858F-4186B67E0049}">
+        <p14:section name="Points Historical" id="{61D62F15-0704-4E43-858F-4186B67E0049}">
           <p14:sldIdLst>
             <p14:sldId id="257"/>
           </p14:sldIdLst>
         </p14:section>
+        <p14:section name="3 Active" id="{8BDD953F-9CEE-43B3-A673-8CEA930F4AD3}">
+          <p14:sldIdLst>
+            <p14:sldId id="258"/>
+          </p14:sldIdLst>
+        </p14:section>
+        <p14:section name="3 Historical" id="{AC0799AC-9108-4EEC-BC2A-5E8E3713890F}">
+          <p14:sldIdLst>
+            <p14:sldId id="259"/>
+          </p14:sldIdLst>
+        </p14:section>
       </p14:sectionLst>
+    </p:ext>
+    <p:ext uri="{EFAFB233-063F-42B5-8137-9DF3F51BA10A}">
+      <p15:sldGuideLst xmlns:p15="http://schemas.microsoft.com/office/powerpoint/2012/main"/>
     </p:ext>
   </p:extLst>
 </p:presentation>
@@ -271,7 +286,7 @@
           <a:p>
             <a:fld id="{DA879754-64A3-4797-A6C0-A73828242C98}" type="datetimeFigureOut">
               <a:rPr lang="en-US" smtClean="0"/>
-              <a:t>12/29/2022</a:t>
+              <a:t>12/30/2022</a:t>
             </a:fld>
             <a:endParaRPr lang="en-US"/>
           </a:p>
@@ -469,7 +484,7 @@
           <a:p>
             <a:fld id="{DA879754-64A3-4797-A6C0-A73828242C98}" type="datetimeFigureOut">
               <a:rPr lang="en-US" smtClean="0"/>
-              <a:t>12/29/2022</a:t>
+              <a:t>12/30/2022</a:t>
             </a:fld>
             <a:endParaRPr lang="en-US"/>
           </a:p>
@@ -677,7 +692,7 @@
           <a:p>
             <a:fld id="{DA879754-64A3-4797-A6C0-A73828242C98}" type="datetimeFigureOut">
               <a:rPr lang="en-US" smtClean="0"/>
-              <a:t>12/29/2022</a:t>
+              <a:t>12/30/2022</a:t>
             </a:fld>
             <a:endParaRPr lang="en-US"/>
           </a:p>
@@ -875,7 +890,7 @@
           <a:p>
             <a:fld id="{DA879754-64A3-4797-A6C0-A73828242C98}" type="datetimeFigureOut">
               <a:rPr lang="en-US" smtClean="0"/>
-              <a:t>12/29/2022</a:t>
+              <a:t>12/30/2022</a:t>
             </a:fld>
             <a:endParaRPr lang="en-US"/>
           </a:p>
@@ -1150,7 +1165,7 @@
           <a:p>
             <a:fld id="{DA879754-64A3-4797-A6C0-A73828242C98}" type="datetimeFigureOut">
               <a:rPr lang="en-US" smtClean="0"/>
-              <a:t>12/29/2022</a:t>
+              <a:t>12/30/2022</a:t>
             </a:fld>
             <a:endParaRPr lang="en-US"/>
           </a:p>
@@ -1415,7 +1430,7 @@
           <a:p>
             <a:fld id="{DA879754-64A3-4797-A6C0-A73828242C98}" type="datetimeFigureOut">
               <a:rPr lang="en-US" smtClean="0"/>
-              <a:t>12/29/2022</a:t>
+              <a:t>12/30/2022</a:t>
             </a:fld>
             <a:endParaRPr lang="en-US"/>
           </a:p>
@@ -1827,7 +1842,7 @@
           <a:p>
             <a:fld id="{DA879754-64A3-4797-A6C0-A73828242C98}" type="datetimeFigureOut">
               <a:rPr lang="en-US" smtClean="0"/>
-              <a:t>12/29/2022</a:t>
+              <a:t>12/30/2022</a:t>
             </a:fld>
             <a:endParaRPr lang="en-US"/>
           </a:p>
@@ -1968,7 +1983,7 @@
           <a:p>
             <a:fld id="{DA879754-64A3-4797-A6C0-A73828242C98}" type="datetimeFigureOut">
               <a:rPr lang="en-US" smtClean="0"/>
-              <a:t>12/29/2022</a:t>
+              <a:t>12/30/2022</a:t>
             </a:fld>
             <a:endParaRPr lang="en-US"/>
           </a:p>
@@ -2081,7 +2096,7 @@
           <a:p>
             <a:fld id="{DA879754-64A3-4797-A6C0-A73828242C98}" type="datetimeFigureOut">
               <a:rPr lang="en-US" smtClean="0"/>
-              <a:t>12/29/2022</a:t>
+              <a:t>12/30/2022</a:t>
             </a:fld>
             <a:endParaRPr lang="en-US"/>
           </a:p>
@@ -2392,7 +2407,7 @@
           <a:p>
             <a:fld id="{DA879754-64A3-4797-A6C0-A73828242C98}" type="datetimeFigureOut">
               <a:rPr lang="en-US" smtClean="0"/>
-              <a:t>12/29/2022</a:t>
+              <a:t>12/30/2022</a:t>
             </a:fld>
             <a:endParaRPr lang="en-US"/>
           </a:p>
@@ -2680,7 +2695,7 @@
           <a:p>
             <a:fld id="{DA879754-64A3-4797-A6C0-A73828242C98}" type="datetimeFigureOut">
               <a:rPr lang="en-US" smtClean="0"/>
-              <a:t>12/29/2022</a:t>
+              <a:t>12/30/2022</a:t>
             </a:fld>
             <a:endParaRPr lang="en-US"/>
           </a:p>
@@ -2921,7 +2936,7 @@
           <a:p>
             <a:fld id="{DA879754-64A3-4797-A6C0-A73828242C98}" type="datetimeFigureOut">
               <a:rPr lang="en-US" smtClean="0"/>
-              <a:t>12/29/2022</a:t>
+              <a:t>12/30/2022</a:t>
             </a:fld>
             <a:endParaRPr lang="en-US"/>
           </a:p>
@@ -3379,10 +3394,10 @@
       </p:cxnSp>
       <p:grpSp>
         <p:nvGrpSpPr>
-          <p:cNvPr id="44" name="Group 43">
-            <a:extLst>
-              <a:ext uri="{FF2B5EF4-FFF2-40B4-BE49-F238E27FC236}">
-                <a16:creationId xmlns:a16="http://schemas.microsoft.com/office/drawing/2014/main" id="{3AEE3BFB-141B-8E90-0AC3-64AE1F986542}"/>
+          <p:cNvPr id="8" name="Group 7">
+            <a:extLst>
+              <a:ext uri="{FF2B5EF4-FFF2-40B4-BE49-F238E27FC236}">
+                <a16:creationId xmlns:a16="http://schemas.microsoft.com/office/drawing/2014/main" id="{28C8A35E-31E2-67D9-52B8-12BCA9F70156}"/>
               </a:ext>
             </a:extLst>
           </p:cNvPr>
@@ -3391,18 +3406,18 @@
         </p:nvGrpSpPr>
         <p:grpSpPr>
           <a:xfrm>
-            <a:off x="83820" y="219843"/>
-            <a:ext cx="12024360" cy="3251814"/>
-            <a:chOff x="83820" y="219843"/>
-            <a:chExt cx="12024360" cy="3251814"/>
+            <a:off x="91844" y="3590873"/>
+            <a:ext cx="12024360" cy="3166090"/>
+            <a:chOff x="91844" y="3590873"/>
+            <a:chExt cx="12024360" cy="3166090"/>
           </a:xfrm>
         </p:grpSpPr>
         <p:pic>
           <p:nvPicPr>
-            <p:cNvPr id="39" name="Picture 38">
+            <p:cNvPr id="3" name="Picture 2">
               <a:extLst>
                 <a:ext uri="{FF2B5EF4-FFF2-40B4-BE49-F238E27FC236}">
-                  <a16:creationId xmlns:a16="http://schemas.microsoft.com/office/drawing/2014/main" id="{27A9BBDB-4C0D-0117-2C89-13155F9B91E4}"/>
+                  <a16:creationId xmlns:a16="http://schemas.microsoft.com/office/drawing/2014/main" id="{828BB990-E95F-B195-9FE1-FA795B956D28}"/>
                 </a:ext>
               </a:extLst>
             </p:cNvPr>
@@ -3419,8 +3434,8 @@
           </p:blipFill>
           <p:spPr>
             <a:xfrm>
-              <a:off x="8148828" y="219843"/>
-              <a:ext cx="3959352" cy="3251814"/>
+              <a:off x="8156852" y="3590873"/>
+              <a:ext cx="3959352" cy="3166090"/>
             </a:xfrm>
             <a:prstGeom prst="rect">
               <a:avLst/>
@@ -3434,10 +3449,10 @@
         </p:pic>
         <p:pic>
           <p:nvPicPr>
-            <p:cNvPr id="41" name="Picture 40">
+            <p:cNvPr id="5" name="Picture 4">
               <a:extLst>
                 <a:ext uri="{FF2B5EF4-FFF2-40B4-BE49-F238E27FC236}">
-                  <a16:creationId xmlns:a16="http://schemas.microsoft.com/office/drawing/2014/main" id="{A37B5A6E-7DB7-5BB8-1CF3-F641BED1F888}"/>
+                  <a16:creationId xmlns:a16="http://schemas.microsoft.com/office/drawing/2014/main" id="{4469171E-E39A-CD04-F3E8-B7997966C80D}"/>
                 </a:ext>
               </a:extLst>
             </p:cNvPr>
@@ -3454,8 +3469,8 @@
           </p:blipFill>
           <p:spPr>
             <a:xfrm>
-              <a:off x="4116324" y="219843"/>
-              <a:ext cx="3959352" cy="3251814"/>
+              <a:off x="4124348" y="3590873"/>
+              <a:ext cx="3959352" cy="3166090"/>
             </a:xfrm>
             <a:prstGeom prst="rect">
               <a:avLst/>
@@ -3469,10 +3484,10 @@
         </p:pic>
         <p:pic>
           <p:nvPicPr>
-            <p:cNvPr id="43" name="Picture 42">
+            <p:cNvPr id="7" name="Picture 6">
               <a:extLst>
                 <a:ext uri="{FF2B5EF4-FFF2-40B4-BE49-F238E27FC236}">
-                  <a16:creationId xmlns:a16="http://schemas.microsoft.com/office/drawing/2014/main" id="{AD824798-87E2-BA92-9506-AF139F1DE52C}"/>
+                  <a16:creationId xmlns:a16="http://schemas.microsoft.com/office/drawing/2014/main" id="{A8D9E011-49F9-05DC-864C-B5F82B063A62}"/>
                 </a:ext>
               </a:extLst>
             </p:cNvPr>
@@ -3489,8 +3504,8 @@
           </p:blipFill>
           <p:spPr>
             <a:xfrm>
-              <a:off x="83820" y="219843"/>
-              <a:ext cx="3959352" cy="3251814"/>
+              <a:off x="91844" y="3590873"/>
+              <a:ext cx="3959352" cy="3166090"/>
             </a:xfrm>
             <a:prstGeom prst="rect">
               <a:avLst/>
@@ -3505,10 +3520,10 @@
       </p:grpSp>
       <p:grpSp>
         <p:nvGrpSpPr>
-          <p:cNvPr id="51" name="Group 50">
-            <a:extLst>
-              <a:ext uri="{FF2B5EF4-FFF2-40B4-BE49-F238E27FC236}">
-                <a16:creationId xmlns:a16="http://schemas.microsoft.com/office/drawing/2014/main" id="{8798633D-13D9-0E25-6421-6F618F14F265}"/>
+          <p:cNvPr id="16" name="Group 15">
+            <a:extLst>
+              <a:ext uri="{FF2B5EF4-FFF2-40B4-BE49-F238E27FC236}">
+                <a16:creationId xmlns:a16="http://schemas.microsoft.com/office/drawing/2014/main" id="{1E9B83CD-0288-4318-D565-F58B4358DC21}"/>
               </a:ext>
             </a:extLst>
           </p:cNvPr>
@@ -3517,18 +3532,18 @@
         </p:nvGrpSpPr>
         <p:grpSpPr>
           <a:xfrm>
-            <a:off x="83820" y="3554259"/>
-            <a:ext cx="12024360" cy="3166090"/>
-            <a:chOff x="83820" y="2386472"/>
-            <a:chExt cx="12024360" cy="3166090"/>
+            <a:off x="91844" y="238355"/>
+            <a:ext cx="12024360" cy="3251814"/>
+            <a:chOff x="91844" y="238355"/>
+            <a:chExt cx="12024360" cy="3251814"/>
           </a:xfrm>
         </p:grpSpPr>
         <p:pic>
           <p:nvPicPr>
-            <p:cNvPr id="46" name="Picture 45">
+            <p:cNvPr id="10" name="Picture 9">
               <a:extLst>
                 <a:ext uri="{FF2B5EF4-FFF2-40B4-BE49-F238E27FC236}">
-                  <a16:creationId xmlns:a16="http://schemas.microsoft.com/office/drawing/2014/main" id="{434727CF-2EF4-AF80-671E-0D34356562DF}"/>
+                  <a16:creationId xmlns:a16="http://schemas.microsoft.com/office/drawing/2014/main" id="{10A5D44C-9A9D-77EB-DDBD-B2B105C5CD99}"/>
                 </a:ext>
               </a:extLst>
             </p:cNvPr>
@@ -3545,8 +3560,8 @@
           </p:blipFill>
           <p:spPr>
             <a:xfrm>
-              <a:off x="8148828" y="2386472"/>
-              <a:ext cx="3959352" cy="3166090"/>
+              <a:off x="8156852" y="238355"/>
+              <a:ext cx="3959352" cy="3251814"/>
             </a:xfrm>
             <a:prstGeom prst="rect">
               <a:avLst/>
@@ -3560,10 +3575,10 @@
         </p:pic>
         <p:pic>
           <p:nvPicPr>
-            <p:cNvPr id="48" name="Picture 47">
+            <p:cNvPr id="12" name="Picture 11">
               <a:extLst>
                 <a:ext uri="{FF2B5EF4-FFF2-40B4-BE49-F238E27FC236}">
-                  <a16:creationId xmlns:a16="http://schemas.microsoft.com/office/drawing/2014/main" id="{AC770FB1-4DD5-CC15-218A-11DBC848E0F2}"/>
+                  <a16:creationId xmlns:a16="http://schemas.microsoft.com/office/drawing/2014/main" id="{A10263BA-1E5A-2C57-85BA-71F9CB0E31E6}"/>
                 </a:ext>
               </a:extLst>
             </p:cNvPr>
@@ -3580,8 +3595,8 @@
           </p:blipFill>
           <p:spPr>
             <a:xfrm>
-              <a:off x="4116324" y="2386472"/>
-              <a:ext cx="3959352" cy="3166090"/>
+              <a:off x="4124348" y="238355"/>
+              <a:ext cx="3959352" cy="3251814"/>
             </a:xfrm>
             <a:prstGeom prst="rect">
               <a:avLst/>
@@ -3595,10 +3610,10 @@
         </p:pic>
         <p:pic>
           <p:nvPicPr>
-            <p:cNvPr id="50" name="Picture 49">
+            <p:cNvPr id="14" name="Picture 13">
               <a:extLst>
                 <a:ext uri="{FF2B5EF4-FFF2-40B4-BE49-F238E27FC236}">
-                  <a16:creationId xmlns:a16="http://schemas.microsoft.com/office/drawing/2014/main" id="{757C3C8B-C526-143E-D8F2-307BC9A78C9F}"/>
+                  <a16:creationId xmlns:a16="http://schemas.microsoft.com/office/drawing/2014/main" id="{BCEE470F-3F59-20E2-BD93-DDCA3626ED7A}"/>
                 </a:ext>
               </a:extLst>
             </p:cNvPr>
@@ -3615,8 +3630,8 @@
           </p:blipFill>
           <p:spPr>
             <a:xfrm>
-              <a:off x="83820" y="2386472"/>
-              <a:ext cx="3959352" cy="3166090"/>
+              <a:off x="91844" y="238355"/>
+              <a:ext cx="3959352" cy="3251814"/>
             </a:xfrm>
             <a:prstGeom prst="rect">
               <a:avLst/>
@@ -3659,132 +3674,6 @@
           <a:chExt cx="0" cy="0"/>
         </a:xfrm>
       </p:grpSpPr>
-      <p:grpSp>
-        <p:nvGrpSpPr>
-          <p:cNvPr id="33" name="Group 32">
-            <a:extLst>
-              <a:ext uri="{FF2B5EF4-FFF2-40B4-BE49-F238E27FC236}">
-                <a16:creationId xmlns:a16="http://schemas.microsoft.com/office/drawing/2014/main" id="{CA3E4B76-2155-D7C5-34D1-9DFEDB547963}"/>
-              </a:ext>
-            </a:extLst>
-          </p:cNvPr>
-          <p:cNvGrpSpPr/>
-          <p:nvPr/>
-        </p:nvGrpSpPr>
-        <p:grpSpPr>
-          <a:xfrm>
-            <a:off x="83820" y="258063"/>
-            <a:ext cx="12024360" cy="3251814"/>
-            <a:chOff x="83820" y="288668"/>
-            <a:chExt cx="12024360" cy="3251814"/>
-          </a:xfrm>
-        </p:grpSpPr>
-        <p:pic>
-          <p:nvPicPr>
-            <p:cNvPr id="10" name="Picture 9">
-              <a:extLst>
-                <a:ext uri="{FF2B5EF4-FFF2-40B4-BE49-F238E27FC236}">
-                  <a16:creationId xmlns:a16="http://schemas.microsoft.com/office/drawing/2014/main" id="{BB55872D-3D11-D937-41DB-CCF46B316C62}"/>
-                </a:ext>
-              </a:extLst>
-            </p:cNvPr>
-            <p:cNvPicPr>
-              <a:picLocks noChangeAspect="1"/>
-            </p:cNvPicPr>
-            <p:nvPr/>
-          </p:nvPicPr>
-          <p:blipFill>
-            <a:blip r:embed="rId2"/>
-            <a:stretch>
-              <a:fillRect/>
-            </a:stretch>
-          </p:blipFill>
-          <p:spPr>
-            <a:xfrm>
-              <a:off x="8148828" y="288668"/>
-              <a:ext cx="3959352" cy="3251814"/>
-            </a:xfrm>
-            <a:prstGeom prst="rect">
-              <a:avLst/>
-            </a:prstGeom>
-            <a:ln>
-              <a:solidFill>
-                <a:schemeClr val="tx1"/>
-              </a:solidFill>
-            </a:ln>
-          </p:spPr>
-        </p:pic>
-        <p:pic>
-          <p:nvPicPr>
-            <p:cNvPr id="12" name="Picture 11">
-              <a:extLst>
-                <a:ext uri="{FF2B5EF4-FFF2-40B4-BE49-F238E27FC236}">
-                  <a16:creationId xmlns:a16="http://schemas.microsoft.com/office/drawing/2014/main" id="{43A0FB4A-C708-4286-2424-C3C44D65FA04}"/>
-                </a:ext>
-              </a:extLst>
-            </p:cNvPr>
-            <p:cNvPicPr>
-              <a:picLocks noChangeAspect="1"/>
-            </p:cNvPicPr>
-            <p:nvPr/>
-          </p:nvPicPr>
-          <p:blipFill>
-            <a:blip r:embed="rId3"/>
-            <a:stretch>
-              <a:fillRect/>
-            </a:stretch>
-          </p:blipFill>
-          <p:spPr>
-            <a:xfrm>
-              <a:off x="4116324" y="288668"/>
-              <a:ext cx="3959352" cy="3251814"/>
-            </a:xfrm>
-            <a:prstGeom prst="rect">
-              <a:avLst/>
-            </a:prstGeom>
-            <a:ln>
-              <a:solidFill>
-                <a:schemeClr val="tx1"/>
-              </a:solidFill>
-            </a:ln>
-          </p:spPr>
-        </p:pic>
-        <p:pic>
-          <p:nvPicPr>
-            <p:cNvPr id="14" name="Picture 13">
-              <a:extLst>
-                <a:ext uri="{FF2B5EF4-FFF2-40B4-BE49-F238E27FC236}">
-                  <a16:creationId xmlns:a16="http://schemas.microsoft.com/office/drawing/2014/main" id="{CB306A6E-1164-1567-7DF6-23B79E2CA3A2}"/>
-                </a:ext>
-              </a:extLst>
-            </p:cNvPr>
-            <p:cNvPicPr>
-              <a:picLocks noChangeAspect="1"/>
-            </p:cNvPicPr>
-            <p:nvPr/>
-          </p:nvPicPr>
-          <p:blipFill>
-            <a:blip r:embed="rId4"/>
-            <a:stretch>
-              <a:fillRect/>
-            </a:stretch>
-          </p:blipFill>
-          <p:spPr>
-            <a:xfrm>
-              <a:off x="83820" y="288668"/>
-              <a:ext cx="3959352" cy="3251814"/>
-            </a:xfrm>
-            <a:prstGeom prst="rect">
-              <a:avLst/>
-            </a:prstGeom>
-            <a:ln>
-              <a:solidFill>
-                <a:schemeClr val="tx1"/>
-              </a:solidFill>
-            </a:ln>
-          </p:spPr>
-        </p:pic>
-      </p:grpSp>
       <p:cxnSp>
         <p:nvCxnSpPr>
           <p:cNvPr id="16" name="Straight Connector 15">
@@ -3826,10 +3715,10 @@
       </p:cxnSp>
       <p:grpSp>
         <p:nvGrpSpPr>
-          <p:cNvPr id="30" name="Group 29">
-            <a:extLst>
-              <a:ext uri="{FF2B5EF4-FFF2-40B4-BE49-F238E27FC236}">
-                <a16:creationId xmlns:a16="http://schemas.microsoft.com/office/drawing/2014/main" id="{F396F1B1-B823-D35B-2AC6-C393636C1D02}"/>
+          <p:cNvPr id="8" name="Group 7">
+            <a:extLst>
+              <a:ext uri="{FF2B5EF4-FFF2-40B4-BE49-F238E27FC236}">
+                <a16:creationId xmlns:a16="http://schemas.microsoft.com/office/drawing/2014/main" id="{EC6A455C-B2BB-21B1-9378-DCA356CA70A1}"/>
               </a:ext>
             </a:extLst>
           </p:cNvPr>
@@ -3838,18 +3727,144 @@
         </p:nvGrpSpPr>
         <p:grpSpPr>
           <a:xfrm>
-            <a:off x="83820" y="3630289"/>
+            <a:off x="83820" y="225851"/>
+            <a:ext cx="12024360" cy="3251814"/>
+            <a:chOff x="83820" y="225851"/>
+            <a:chExt cx="12024360" cy="3251814"/>
+          </a:xfrm>
+        </p:grpSpPr>
+        <p:pic>
+          <p:nvPicPr>
+            <p:cNvPr id="3" name="Picture 2">
+              <a:extLst>
+                <a:ext uri="{FF2B5EF4-FFF2-40B4-BE49-F238E27FC236}">
+                  <a16:creationId xmlns:a16="http://schemas.microsoft.com/office/drawing/2014/main" id="{C7D7046F-FCA0-38A0-8914-D8E5DBA53E57}"/>
+                </a:ext>
+              </a:extLst>
+            </p:cNvPr>
+            <p:cNvPicPr>
+              <a:picLocks noChangeAspect="1"/>
+            </p:cNvPicPr>
+            <p:nvPr/>
+          </p:nvPicPr>
+          <p:blipFill>
+            <a:blip r:embed="rId2"/>
+            <a:stretch>
+              <a:fillRect/>
+            </a:stretch>
+          </p:blipFill>
+          <p:spPr>
+            <a:xfrm>
+              <a:off x="8148828" y="225851"/>
+              <a:ext cx="3959352" cy="3251814"/>
+            </a:xfrm>
+            <a:prstGeom prst="rect">
+              <a:avLst/>
+            </a:prstGeom>
+            <a:ln>
+              <a:solidFill>
+                <a:schemeClr val="tx1"/>
+              </a:solidFill>
+            </a:ln>
+          </p:spPr>
+        </p:pic>
+        <p:pic>
+          <p:nvPicPr>
+            <p:cNvPr id="5" name="Picture 4">
+              <a:extLst>
+                <a:ext uri="{FF2B5EF4-FFF2-40B4-BE49-F238E27FC236}">
+                  <a16:creationId xmlns:a16="http://schemas.microsoft.com/office/drawing/2014/main" id="{BCDE13D9-32C3-5533-FD21-FF464EFC7FEB}"/>
+                </a:ext>
+              </a:extLst>
+            </p:cNvPr>
+            <p:cNvPicPr>
+              <a:picLocks noChangeAspect="1"/>
+            </p:cNvPicPr>
+            <p:nvPr/>
+          </p:nvPicPr>
+          <p:blipFill>
+            <a:blip r:embed="rId3"/>
+            <a:stretch>
+              <a:fillRect/>
+            </a:stretch>
+          </p:blipFill>
+          <p:spPr>
+            <a:xfrm>
+              <a:off x="4116324" y="225851"/>
+              <a:ext cx="3959352" cy="3251814"/>
+            </a:xfrm>
+            <a:prstGeom prst="rect">
+              <a:avLst/>
+            </a:prstGeom>
+            <a:ln>
+              <a:solidFill>
+                <a:schemeClr val="tx1"/>
+              </a:solidFill>
+            </a:ln>
+          </p:spPr>
+        </p:pic>
+        <p:pic>
+          <p:nvPicPr>
+            <p:cNvPr id="7" name="Picture 6">
+              <a:extLst>
+                <a:ext uri="{FF2B5EF4-FFF2-40B4-BE49-F238E27FC236}">
+                  <a16:creationId xmlns:a16="http://schemas.microsoft.com/office/drawing/2014/main" id="{149DFAC2-9DF3-A3D7-56B2-174E463C9D92}"/>
+                </a:ext>
+              </a:extLst>
+            </p:cNvPr>
+            <p:cNvPicPr>
+              <a:picLocks noChangeAspect="1"/>
+            </p:cNvPicPr>
+            <p:nvPr/>
+          </p:nvPicPr>
+          <p:blipFill>
+            <a:blip r:embed="rId4"/>
+            <a:stretch>
+              <a:fillRect/>
+            </a:stretch>
+          </p:blipFill>
+          <p:spPr>
+            <a:xfrm>
+              <a:off x="83820" y="225851"/>
+              <a:ext cx="3959352" cy="3251814"/>
+            </a:xfrm>
+            <a:prstGeom prst="rect">
+              <a:avLst/>
+            </a:prstGeom>
+            <a:ln>
+              <a:solidFill>
+                <a:schemeClr val="tx1"/>
+              </a:solidFill>
+            </a:ln>
+          </p:spPr>
+        </p:pic>
+      </p:grpSp>
+      <p:grpSp>
+        <p:nvGrpSpPr>
+          <p:cNvPr id="20" name="Group 19">
+            <a:extLst>
+              <a:ext uri="{FF2B5EF4-FFF2-40B4-BE49-F238E27FC236}">
+                <a16:creationId xmlns:a16="http://schemas.microsoft.com/office/drawing/2014/main" id="{05FB0676-B37E-E2A3-B24C-2D1DDB395A1B}"/>
+              </a:ext>
+            </a:extLst>
+          </p:cNvPr>
+          <p:cNvGrpSpPr/>
+          <p:nvPr/>
+        </p:nvGrpSpPr>
+        <p:grpSpPr>
+          <a:xfrm>
+            <a:off x="83820" y="3552177"/>
             <a:ext cx="12024360" cy="3090060"/>
-            <a:chOff x="83820" y="3630289"/>
+            <a:chOff x="83820" y="3552177"/>
             <a:chExt cx="12024360" cy="3090060"/>
           </a:xfrm>
         </p:grpSpPr>
         <p:pic>
           <p:nvPicPr>
-            <p:cNvPr id="19" name="Picture 18">
+            <p:cNvPr id="11" name="Picture 10">
               <a:extLst>
                 <a:ext uri="{FF2B5EF4-FFF2-40B4-BE49-F238E27FC236}">
-                  <a16:creationId xmlns:a16="http://schemas.microsoft.com/office/drawing/2014/main" id="{6D959091-D151-F233-F07F-713F28A36AC0}"/>
+                  <a16:creationId xmlns:a16="http://schemas.microsoft.com/office/drawing/2014/main" id="{1F90E070-C7E7-5710-CE66-3DBCB2B7E795}"/>
                 </a:ext>
               </a:extLst>
             </p:cNvPr>
@@ -3866,7 +3881,7 @@
           </p:blipFill>
           <p:spPr>
             <a:xfrm>
-              <a:off x="8148828" y="3630289"/>
+              <a:off x="8148828" y="3552177"/>
               <a:ext cx="3959352" cy="3090060"/>
             </a:xfrm>
             <a:prstGeom prst="rect">
@@ -3881,10 +3896,10 @@
         </p:pic>
         <p:pic>
           <p:nvPicPr>
-            <p:cNvPr id="23" name="Picture 22">
+            <p:cNvPr id="15" name="Picture 14">
               <a:extLst>
                 <a:ext uri="{FF2B5EF4-FFF2-40B4-BE49-F238E27FC236}">
-                  <a16:creationId xmlns:a16="http://schemas.microsoft.com/office/drawing/2014/main" id="{935AE614-6420-1628-808F-63B385C2C8CE}"/>
+                  <a16:creationId xmlns:a16="http://schemas.microsoft.com/office/drawing/2014/main" id="{6906BC2B-EFAF-F507-4567-510B892DA62F}"/>
                 </a:ext>
               </a:extLst>
             </p:cNvPr>
@@ -3901,7 +3916,7 @@
           </p:blipFill>
           <p:spPr>
             <a:xfrm>
-              <a:off x="4116324" y="3630289"/>
+              <a:off x="4116324" y="3552177"/>
               <a:ext cx="3959352" cy="3090060"/>
             </a:xfrm>
             <a:prstGeom prst="rect">
@@ -3916,10 +3931,10 @@
         </p:pic>
         <p:pic>
           <p:nvPicPr>
-            <p:cNvPr id="26" name="Picture 25">
+            <p:cNvPr id="18" name="Picture 17">
               <a:extLst>
                 <a:ext uri="{FF2B5EF4-FFF2-40B4-BE49-F238E27FC236}">
-                  <a16:creationId xmlns:a16="http://schemas.microsoft.com/office/drawing/2014/main" id="{D7C35061-A3D8-9317-CB78-D39AA6D44C92}"/>
+                  <a16:creationId xmlns:a16="http://schemas.microsoft.com/office/drawing/2014/main" id="{6ED81753-9205-2D14-5F50-C5BBF3FCA758}"/>
                 </a:ext>
               </a:extLst>
             </p:cNvPr>
@@ -3936,7 +3951,7 @@
           </p:blipFill>
           <p:spPr>
             <a:xfrm>
-              <a:off x="83820" y="3630289"/>
+              <a:off x="83820" y="3552177"/>
               <a:ext cx="3959352" cy="3090060"/>
             </a:xfrm>
             <a:prstGeom prst="rect">
@@ -3954,6 +3969,648 @@
     <p:extLst>
       <p:ext uri="{BB962C8B-B14F-4D97-AF65-F5344CB8AC3E}">
         <p14:creationId xmlns:p14="http://schemas.microsoft.com/office/powerpoint/2010/main" val="3664775258"/>
+      </p:ext>
+    </p:extLst>
+  </p:cSld>
+  <p:clrMapOvr>
+    <a:masterClrMapping/>
+  </p:clrMapOvr>
+</p:sld>
+</file>
+
+<file path=ppt/slides/slide3.xml><?xml version="1.0" encoding="utf-8"?>
+<p:sld xmlns:a="http://schemas.openxmlformats.org/drawingml/2006/main" xmlns:r="http://schemas.openxmlformats.org/officeDocument/2006/relationships" xmlns:p="http://schemas.openxmlformats.org/presentationml/2006/main">
+  <p:cSld>
+    <p:spTree>
+      <p:nvGrpSpPr>
+        <p:cNvPr id="1" name=""/>
+        <p:cNvGrpSpPr/>
+        <p:nvPr/>
+      </p:nvGrpSpPr>
+      <p:grpSpPr>
+        <a:xfrm>
+          <a:off x="0" y="0"/>
+          <a:ext cx="0" cy="0"/>
+          <a:chOff x="0" y="0"/>
+          <a:chExt cx="0" cy="0"/>
+        </a:xfrm>
+      </p:grpSpPr>
+      <p:cxnSp>
+        <p:nvCxnSpPr>
+          <p:cNvPr id="16" name="Straight Connector 15">
+            <a:extLst>
+              <a:ext uri="{FF2B5EF4-FFF2-40B4-BE49-F238E27FC236}">
+                <a16:creationId xmlns:a16="http://schemas.microsoft.com/office/drawing/2014/main" id="{152EC909-8E58-2E55-794D-718E22B929CC}"/>
+              </a:ext>
+            </a:extLst>
+          </p:cNvPr>
+          <p:cNvCxnSpPr>
+            <a:cxnSpLocks/>
+          </p:cNvCxnSpPr>
+          <p:nvPr/>
+        </p:nvCxnSpPr>
+        <p:spPr>
+          <a:xfrm>
+            <a:off x="83820" y="137651"/>
+            <a:ext cx="12024360" cy="0"/>
+          </a:xfrm>
+          <a:prstGeom prst="line">
+            <a:avLst/>
+          </a:prstGeom>
+          <a:ln w="76200"/>
+        </p:spPr>
+        <p:style>
+          <a:lnRef idx="1">
+            <a:schemeClr val="accent1"/>
+          </a:lnRef>
+          <a:fillRef idx="0">
+            <a:schemeClr val="accent1"/>
+          </a:fillRef>
+          <a:effectRef idx="0">
+            <a:schemeClr val="accent1"/>
+          </a:effectRef>
+          <a:fontRef idx="minor">
+            <a:schemeClr val="tx1"/>
+          </a:fontRef>
+        </p:style>
+      </p:cxnSp>
+      <p:grpSp>
+        <p:nvGrpSpPr>
+          <p:cNvPr id="13" name="Group 12">
+            <a:extLst>
+              <a:ext uri="{FF2B5EF4-FFF2-40B4-BE49-F238E27FC236}">
+                <a16:creationId xmlns:a16="http://schemas.microsoft.com/office/drawing/2014/main" id="{18762BB5-E932-E9B5-4A6F-F0AC061C898E}"/>
+              </a:ext>
+            </a:extLst>
+          </p:cNvPr>
+          <p:cNvGrpSpPr/>
+          <p:nvPr/>
+        </p:nvGrpSpPr>
+        <p:grpSpPr>
+          <a:xfrm>
+            <a:off x="83820" y="3480232"/>
+            <a:ext cx="12024362" cy="3240117"/>
+            <a:chOff x="83820" y="308330"/>
+            <a:chExt cx="12024362" cy="3240117"/>
+          </a:xfrm>
+        </p:grpSpPr>
+        <p:pic>
+          <p:nvPicPr>
+            <p:cNvPr id="4" name="Picture 3">
+              <a:extLst>
+                <a:ext uri="{FF2B5EF4-FFF2-40B4-BE49-F238E27FC236}">
+                  <a16:creationId xmlns:a16="http://schemas.microsoft.com/office/drawing/2014/main" id="{A3AD53B5-A7FA-7394-AFB2-E78F77A91B21}"/>
+                </a:ext>
+              </a:extLst>
+            </p:cNvPr>
+            <p:cNvPicPr>
+              <a:picLocks noChangeAspect="1"/>
+            </p:cNvPicPr>
+            <p:nvPr/>
+          </p:nvPicPr>
+          <p:blipFill>
+            <a:blip r:embed="rId2"/>
+            <a:stretch>
+              <a:fillRect/>
+            </a:stretch>
+          </p:blipFill>
+          <p:spPr>
+            <a:xfrm>
+              <a:off x="83820" y="308330"/>
+              <a:ext cx="3959352" cy="3240117"/>
+            </a:xfrm>
+            <a:prstGeom prst="rect">
+              <a:avLst/>
+            </a:prstGeom>
+            <a:ln>
+              <a:solidFill>
+                <a:schemeClr val="tx1"/>
+              </a:solidFill>
+            </a:ln>
+          </p:spPr>
+        </p:pic>
+        <p:pic>
+          <p:nvPicPr>
+            <p:cNvPr id="9" name="Picture 8">
+              <a:extLst>
+                <a:ext uri="{FF2B5EF4-FFF2-40B4-BE49-F238E27FC236}">
+                  <a16:creationId xmlns:a16="http://schemas.microsoft.com/office/drawing/2014/main" id="{463DB442-8FBB-8838-6936-A099863EEFBD}"/>
+                </a:ext>
+              </a:extLst>
+            </p:cNvPr>
+            <p:cNvPicPr>
+              <a:picLocks noChangeAspect="1"/>
+            </p:cNvPicPr>
+            <p:nvPr/>
+          </p:nvPicPr>
+          <p:blipFill>
+            <a:blip r:embed="rId3"/>
+            <a:stretch>
+              <a:fillRect/>
+            </a:stretch>
+          </p:blipFill>
+          <p:spPr>
+            <a:xfrm>
+              <a:off x="4116324" y="308330"/>
+              <a:ext cx="3959352" cy="3240107"/>
+            </a:xfrm>
+            <a:prstGeom prst="rect">
+              <a:avLst/>
+            </a:prstGeom>
+            <a:ln>
+              <a:solidFill>
+                <a:schemeClr val="tx1"/>
+              </a:solidFill>
+            </a:ln>
+          </p:spPr>
+        </p:pic>
+        <p:pic>
+          <p:nvPicPr>
+            <p:cNvPr id="12" name="Picture 11">
+              <a:extLst>
+                <a:ext uri="{FF2B5EF4-FFF2-40B4-BE49-F238E27FC236}">
+                  <a16:creationId xmlns:a16="http://schemas.microsoft.com/office/drawing/2014/main" id="{6E93AD1B-00A5-5203-D734-F6B70EAF4130}"/>
+                </a:ext>
+              </a:extLst>
+            </p:cNvPr>
+            <p:cNvPicPr>
+              <a:picLocks noChangeAspect="1"/>
+            </p:cNvPicPr>
+            <p:nvPr/>
+          </p:nvPicPr>
+          <p:blipFill>
+            <a:blip r:embed="rId4"/>
+            <a:stretch>
+              <a:fillRect/>
+            </a:stretch>
+          </p:blipFill>
+          <p:spPr>
+            <a:xfrm>
+              <a:off x="8148830" y="308330"/>
+              <a:ext cx="3959352" cy="3240117"/>
+            </a:xfrm>
+            <a:prstGeom prst="rect">
+              <a:avLst/>
+            </a:prstGeom>
+            <a:ln>
+              <a:solidFill>
+                <a:schemeClr val="tx1"/>
+              </a:solidFill>
+            </a:ln>
+          </p:spPr>
+        </p:pic>
+      </p:grpSp>
+      <p:grpSp>
+        <p:nvGrpSpPr>
+          <p:cNvPr id="24" name="Group 23">
+            <a:extLst>
+              <a:ext uri="{FF2B5EF4-FFF2-40B4-BE49-F238E27FC236}">
+                <a16:creationId xmlns:a16="http://schemas.microsoft.com/office/drawing/2014/main" id="{E08C5131-A0A5-1190-6D52-BA7D6DCCFEC9}"/>
+              </a:ext>
+            </a:extLst>
+          </p:cNvPr>
+          <p:cNvGrpSpPr/>
+          <p:nvPr/>
+        </p:nvGrpSpPr>
+        <p:grpSpPr>
+          <a:xfrm>
+            <a:off x="83819" y="200496"/>
+            <a:ext cx="12024362" cy="3228504"/>
+            <a:chOff x="83819" y="200496"/>
+            <a:chExt cx="12024362" cy="3228504"/>
+          </a:xfrm>
+        </p:grpSpPr>
+        <p:pic>
+          <p:nvPicPr>
+            <p:cNvPr id="17" name="Picture 16">
+              <a:extLst>
+                <a:ext uri="{FF2B5EF4-FFF2-40B4-BE49-F238E27FC236}">
+                  <a16:creationId xmlns:a16="http://schemas.microsoft.com/office/drawing/2014/main" id="{B9F49391-6F67-40FD-7F35-FE8BDDDA2BDB}"/>
+                </a:ext>
+              </a:extLst>
+            </p:cNvPr>
+            <p:cNvPicPr>
+              <a:picLocks noChangeAspect="1"/>
+            </p:cNvPicPr>
+            <p:nvPr/>
+          </p:nvPicPr>
+          <p:blipFill>
+            <a:blip r:embed="rId5"/>
+            <a:stretch>
+              <a:fillRect/>
+            </a:stretch>
+          </p:blipFill>
+          <p:spPr>
+            <a:xfrm>
+              <a:off x="83819" y="200496"/>
+              <a:ext cx="3959352" cy="3228504"/>
+            </a:xfrm>
+            <a:prstGeom prst="rect">
+              <a:avLst/>
+            </a:prstGeom>
+            <a:ln>
+              <a:solidFill>
+                <a:schemeClr val="tx1"/>
+              </a:solidFill>
+            </a:ln>
+          </p:spPr>
+        </p:pic>
+        <p:pic>
+          <p:nvPicPr>
+            <p:cNvPr id="21" name="Picture 20">
+              <a:extLst>
+                <a:ext uri="{FF2B5EF4-FFF2-40B4-BE49-F238E27FC236}">
+                  <a16:creationId xmlns:a16="http://schemas.microsoft.com/office/drawing/2014/main" id="{F46ECD04-A525-25E6-BD03-F7B59FCFD48E}"/>
+                </a:ext>
+              </a:extLst>
+            </p:cNvPr>
+            <p:cNvPicPr>
+              <a:picLocks noChangeAspect="1"/>
+            </p:cNvPicPr>
+            <p:nvPr/>
+          </p:nvPicPr>
+          <p:blipFill>
+            <a:blip r:embed="rId6"/>
+            <a:stretch>
+              <a:fillRect/>
+            </a:stretch>
+          </p:blipFill>
+          <p:spPr>
+            <a:xfrm>
+              <a:off x="4116324" y="200496"/>
+              <a:ext cx="3959352" cy="3228504"/>
+            </a:xfrm>
+            <a:prstGeom prst="rect">
+              <a:avLst/>
+            </a:prstGeom>
+            <a:ln>
+              <a:solidFill>
+                <a:schemeClr val="tx1"/>
+              </a:solidFill>
+            </a:ln>
+          </p:spPr>
+        </p:pic>
+        <p:pic>
+          <p:nvPicPr>
+            <p:cNvPr id="23" name="Picture 22">
+              <a:extLst>
+                <a:ext uri="{FF2B5EF4-FFF2-40B4-BE49-F238E27FC236}">
+                  <a16:creationId xmlns:a16="http://schemas.microsoft.com/office/drawing/2014/main" id="{8DDAC3CB-3024-57BF-8295-A49F7A46CF45}"/>
+                </a:ext>
+              </a:extLst>
+            </p:cNvPr>
+            <p:cNvPicPr>
+              <a:picLocks noChangeAspect="1"/>
+            </p:cNvPicPr>
+            <p:nvPr/>
+          </p:nvPicPr>
+          <p:blipFill>
+            <a:blip r:embed="rId7"/>
+            <a:stretch>
+              <a:fillRect/>
+            </a:stretch>
+          </p:blipFill>
+          <p:spPr>
+            <a:xfrm>
+              <a:off x="8148829" y="200496"/>
+              <a:ext cx="3959352" cy="3228504"/>
+            </a:xfrm>
+            <a:prstGeom prst="rect">
+              <a:avLst/>
+            </a:prstGeom>
+            <a:ln>
+              <a:solidFill>
+                <a:schemeClr val="tx1"/>
+              </a:solidFill>
+            </a:ln>
+          </p:spPr>
+        </p:pic>
+      </p:grpSp>
+    </p:spTree>
+    <p:extLst>
+      <p:ext uri="{BB962C8B-B14F-4D97-AF65-F5344CB8AC3E}">
+        <p14:creationId xmlns:p14="http://schemas.microsoft.com/office/powerpoint/2010/main" val="1993852050"/>
+      </p:ext>
+    </p:extLst>
+  </p:cSld>
+  <p:clrMapOvr>
+    <a:masterClrMapping/>
+  </p:clrMapOvr>
+</p:sld>
+</file>
+
+<file path=ppt/slides/slide4.xml><?xml version="1.0" encoding="utf-8"?>
+<p:sld xmlns:a="http://schemas.openxmlformats.org/drawingml/2006/main" xmlns:r="http://schemas.openxmlformats.org/officeDocument/2006/relationships" xmlns:p="http://schemas.openxmlformats.org/presentationml/2006/main">
+  <p:cSld>
+    <p:spTree>
+      <p:nvGrpSpPr>
+        <p:cNvPr id="1" name=""/>
+        <p:cNvGrpSpPr/>
+        <p:nvPr/>
+      </p:nvGrpSpPr>
+      <p:grpSpPr>
+        <a:xfrm>
+          <a:off x="0" y="0"/>
+          <a:ext cx="0" cy="0"/>
+          <a:chOff x="0" y="0"/>
+          <a:chExt cx="0" cy="0"/>
+        </a:xfrm>
+      </p:grpSpPr>
+      <p:cxnSp>
+        <p:nvCxnSpPr>
+          <p:cNvPr id="16" name="Straight Connector 15">
+            <a:extLst>
+              <a:ext uri="{FF2B5EF4-FFF2-40B4-BE49-F238E27FC236}">
+                <a16:creationId xmlns:a16="http://schemas.microsoft.com/office/drawing/2014/main" id="{152EC909-8E58-2E55-794D-718E22B929CC}"/>
+              </a:ext>
+            </a:extLst>
+          </p:cNvPr>
+          <p:cNvCxnSpPr>
+            <a:cxnSpLocks/>
+          </p:cNvCxnSpPr>
+          <p:nvPr/>
+        </p:nvCxnSpPr>
+        <p:spPr>
+          <a:xfrm>
+            <a:off x="83820" y="137651"/>
+            <a:ext cx="12024360" cy="0"/>
+          </a:xfrm>
+          <a:prstGeom prst="line">
+            <a:avLst/>
+          </a:prstGeom>
+          <a:ln w="76200"/>
+        </p:spPr>
+        <p:style>
+          <a:lnRef idx="1">
+            <a:schemeClr val="accent1"/>
+          </a:lnRef>
+          <a:fillRef idx="0">
+            <a:schemeClr val="accent1"/>
+          </a:fillRef>
+          <a:effectRef idx="0">
+            <a:schemeClr val="accent1"/>
+          </a:effectRef>
+          <a:fontRef idx="minor">
+            <a:schemeClr val="tx1"/>
+          </a:fontRef>
+        </p:style>
+      </p:cxnSp>
+      <p:grpSp>
+        <p:nvGrpSpPr>
+          <p:cNvPr id="14" name="Group 13">
+            <a:extLst>
+              <a:ext uri="{FF2B5EF4-FFF2-40B4-BE49-F238E27FC236}">
+                <a16:creationId xmlns:a16="http://schemas.microsoft.com/office/drawing/2014/main" id="{EFBC766E-8BEE-A25E-09F6-0130BF61CC4D}"/>
+              </a:ext>
+            </a:extLst>
+          </p:cNvPr>
+          <p:cNvGrpSpPr/>
+          <p:nvPr/>
+        </p:nvGrpSpPr>
+        <p:grpSpPr>
+          <a:xfrm>
+            <a:off x="83820" y="253238"/>
+            <a:ext cx="12024362" cy="3111408"/>
+            <a:chOff x="83820" y="253238"/>
+            <a:chExt cx="12024362" cy="3111408"/>
+          </a:xfrm>
+        </p:grpSpPr>
+        <p:pic>
+          <p:nvPicPr>
+            <p:cNvPr id="6" name="Picture 5">
+              <a:extLst>
+                <a:ext uri="{FF2B5EF4-FFF2-40B4-BE49-F238E27FC236}">
+                  <a16:creationId xmlns:a16="http://schemas.microsoft.com/office/drawing/2014/main" id="{891E56C9-ECCD-CEA1-3DBA-D8AEE127D6C2}"/>
+                </a:ext>
+              </a:extLst>
+            </p:cNvPr>
+            <p:cNvPicPr>
+              <a:picLocks noChangeAspect="1"/>
+            </p:cNvPicPr>
+            <p:nvPr/>
+          </p:nvPicPr>
+          <p:blipFill>
+            <a:blip r:embed="rId2"/>
+            <a:stretch>
+              <a:fillRect/>
+            </a:stretch>
+          </p:blipFill>
+          <p:spPr>
+            <a:xfrm>
+              <a:off x="83820" y="253238"/>
+              <a:ext cx="3959352" cy="3111408"/>
+            </a:xfrm>
+            <a:prstGeom prst="rect">
+              <a:avLst/>
+            </a:prstGeom>
+            <a:ln>
+              <a:solidFill>
+                <a:schemeClr val="tx1"/>
+              </a:solidFill>
+            </a:ln>
+          </p:spPr>
+        </p:pic>
+        <p:pic>
+          <p:nvPicPr>
+            <p:cNvPr id="8" name="Picture 7">
+              <a:extLst>
+                <a:ext uri="{FF2B5EF4-FFF2-40B4-BE49-F238E27FC236}">
+                  <a16:creationId xmlns:a16="http://schemas.microsoft.com/office/drawing/2014/main" id="{37087C2C-14C4-1BCD-0FF4-49D523D8F8E1}"/>
+                </a:ext>
+              </a:extLst>
+            </p:cNvPr>
+            <p:cNvPicPr>
+              <a:picLocks noChangeAspect="1"/>
+            </p:cNvPicPr>
+            <p:nvPr/>
+          </p:nvPicPr>
+          <p:blipFill>
+            <a:blip r:embed="rId3"/>
+            <a:stretch>
+              <a:fillRect/>
+            </a:stretch>
+          </p:blipFill>
+          <p:spPr>
+            <a:xfrm>
+              <a:off x="4116325" y="253238"/>
+              <a:ext cx="3959352" cy="3111408"/>
+            </a:xfrm>
+            <a:prstGeom prst="rect">
+              <a:avLst/>
+            </a:prstGeom>
+            <a:ln>
+              <a:solidFill>
+                <a:schemeClr val="tx1"/>
+              </a:solidFill>
+            </a:ln>
+          </p:spPr>
+        </p:pic>
+        <p:pic>
+          <p:nvPicPr>
+            <p:cNvPr id="11" name="Picture 10">
+              <a:extLst>
+                <a:ext uri="{FF2B5EF4-FFF2-40B4-BE49-F238E27FC236}">
+                  <a16:creationId xmlns:a16="http://schemas.microsoft.com/office/drawing/2014/main" id="{50003439-08A4-A864-7110-A4B6E4ECCDF5}"/>
+                </a:ext>
+              </a:extLst>
+            </p:cNvPr>
+            <p:cNvPicPr>
+              <a:picLocks noChangeAspect="1"/>
+            </p:cNvPicPr>
+            <p:nvPr/>
+          </p:nvPicPr>
+          <p:blipFill>
+            <a:blip r:embed="rId4"/>
+            <a:stretch>
+              <a:fillRect/>
+            </a:stretch>
+          </p:blipFill>
+          <p:spPr>
+            <a:xfrm>
+              <a:off x="8148830" y="253238"/>
+              <a:ext cx="3959352" cy="3111408"/>
+            </a:xfrm>
+            <a:prstGeom prst="rect">
+              <a:avLst/>
+            </a:prstGeom>
+            <a:ln>
+              <a:solidFill>
+                <a:schemeClr val="tx1"/>
+              </a:solidFill>
+            </a:ln>
+          </p:spPr>
+        </p:pic>
+      </p:grpSp>
+      <p:grpSp>
+        <p:nvGrpSpPr>
+          <p:cNvPr id="37" name="Group 36">
+            <a:extLst>
+              <a:ext uri="{FF2B5EF4-FFF2-40B4-BE49-F238E27FC236}">
+                <a16:creationId xmlns:a16="http://schemas.microsoft.com/office/drawing/2014/main" id="{B70D0E66-4000-C702-662A-CEF4026C3476}"/>
+              </a:ext>
+            </a:extLst>
+          </p:cNvPr>
+          <p:cNvGrpSpPr/>
+          <p:nvPr/>
+        </p:nvGrpSpPr>
+        <p:grpSpPr>
+          <a:xfrm>
+            <a:off x="83820" y="3493355"/>
+            <a:ext cx="12024362" cy="3240117"/>
+            <a:chOff x="83820" y="1458707"/>
+            <a:chExt cx="12024362" cy="3240117"/>
+          </a:xfrm>
+        </p:grpSpPr>
+        <p:pic>
+          <p:nvPicPr>
+            <p:cNvPr id="32" name="Picture 31">
+              <a:extLst>
+                <a:ext uri="{FF2B5EF4-FFF2-40B4-BE49-F238E27FC236}">
+                  <a16:creationId xmlns:a16="http://schemas.microsoft.com/office/drawing/2014/main" id="{A7430064-D19D-2275-91A9-3AAFC94F006B}"/>
+                </a:ext>
+              </a:extLst>
+            </p:cNvPr>
+            <p:cNvPicPr>
+              <a:picLocks noChangeAspect="1"/>
+            </p:cNvPicPr>
+            <p:nvPr/>
+          </p:nvPicPr>
+          <p:blipFill>
+            <a:blip r:embed="rId5"/>
+            <a:stretch>
+              <a:fillRect/>
+            </a:stretch>
+          </p:blipFill>
+          <p:spPr>
+            <a:xfrm>
+              <a:off x="83820" y="1458707"/>
+              <a:ext cx="3959352" cy="3240117"/>
+            </a:xfrm>
+            <a:prstGeom prst="rect">
+              <a:avLst/>
+            </a:prstGeom>
+            <a:ln>
+              <a:solidFill>
+                <a:schemeClr val="tx1"/>
+              </a:solidFill>
+            </a:ln>
+          </p:spPr>
+        </p:pic>
+        <p:pic>
+          <p:nvPicPr>
+            <p:cNvPr id="34" name="Picture 33">
+              <a:extLst>
+                <a:ext uri="{FF2B5EF4-FFF2-40B4-BE49-F238E27FC236}">
+                  <a16:creationId xmlns:a16="http://schemas.microsoft.com/office/drawing/2014/main" id="{059476AD-D008-B02C-B79E-A9E9AC5494A3}"/>
+                </a:ext>
+              </a:extLst>
+            </p:cNvPr>
+            <p:cNvPicPr>
+              <a:picLocks noChangeAspect="1"/>
+            </p:cNvPicPr>
+            <p:nvPr/>
+          </p:nvPicPr>
+          <p:blipFill>
+            <a:blip r:embed="rId6"/>
+            <a:stretch>
+              <a:fillRect/>
+            </a:stretch>
+          </p:blipFill>
+          <p:spPr>
+            <a:xfrm>
+              <a:off x="4116325" y="1458707"/>
+              <a:ext cx="3959352" cy="3240117"/>
+            </a:xfrm>
+            <a:prstGeom prst="rect">
+              <a:avLst/>
+            </a:prstGeom>
+            <a:ln>
+              <a:solidFill>
+                <a:schemeClr val="tx1"/>
+              </a:solidFill>
+            </a:ln>
+          </p:spPr>
+        </p:pic>
+        <p:pic>
+          <p:nvPicPr>
+            <p:cNvPr id="36" name="Picture 35">
+              <a:extLst>
+                <a:ext uri="{FF2B5EF4-FFF2-40B4-BE49-F238E27FC236}">
+                  <a16:creationId xmlns:a16="http://schemas.microsoft.com/office/drawing/2014/main" id="{53A0EA09-C47E-8227-F1AA-8C04BB5270A7}"/>
+                </a:ext>
+              </a:extLst>
+            </p:cNvPr>
+            <p:cNvPicPr>
+              <a:picLocks noChangeAspect="1"/>
+            </p:cNvPicPr>
+            <p:nvPr/>
+          </p:nvPicPr>
+          <p:blipFill>
+            <a:blip r:embed="rId7"/>
+            <a:stretch>
+              <a:fillRect/>
+            </a:stretch>
+          </p:blipFill>
+          <p:spPr>
+            <a:xfrm>
+              <a:off x="8148830" y="1458707"/>
+              <a:ext cx="3959352" cy="3240117"/>
+            </a:xfrm>
+            <a:prstGeom prst="rect">
+              <a:avLst/>
+            </a:prstGeom>
+            <a:ln>
+              <a:solidFill>
+                <a:schemeClr val="tx1"/>
+              </a:solidFill>
+            </a:ln>
+          </p:spPr>
+        </p:pic>
+      </p:grpSp>
+    </p:spTree>
+    <p:extLst>
+      <p:ext uri="{BB962C8B-B14F-4D97-AF65-F5344CB8AC3E}">
+        <p14:creationId xmlns:p14="http://schemas.microsoft.com/office/powerpoint/2010/main" val="955419474"/>
       </p:ext>
     </p:extLst>
   </p:cSld>

</xml_diff>

<commit_message>
new 3pt historical plus
</commit_message>
<xml_diff>
--- a/data/basketballProject/reference-files/publishing-presentation.pptx
+++ b/data/basketballProject/reference-files/publishing-presentation.pptx
@@ -4357,132 +4357,6 @@
       </p:cxnSp>
       <p:grpSp>
         <p:nvGrpSpPr>
-          <p:cNvPr id="14" name="Group 13">
-            <a:extLst>
-              <a:ext uri="{FF2B5EF4-FFF2-40B4-BE49-F238E27FC236}">
-                <a16:creationId xmlns:a16="http://schemas.microsoft.com/office/drawing/2014/main" id="{EFBC766E-8BEE-A25E-09F6-0130BF61CC4D}"/>
-              </a:ext>
-            </a:extLst>
-          </p:cNvPr>
-          <p:cNvGrpSpPr/>
-          <p:nvPr/>
-        </p:nvGrpSpPr>
-        <p:grpSpPr>
-          <a:xfrm>
-            <a:off x="83820" y="253238"/>
-            <a:ext cx="12024362" cy="3111408"/>
-            <a:chOff x="83820" y="253238"/>
-            <a:chExt cx="12024362" cy="3111408"/>
-          </a:xfrm>
-        </p:grpSpPr>
-        <p:pic>
-          <p:nvPicPr>
-            <p:cNvPr id="6" name="Picture 5">
-              <a:extLst>
-                <a:ext uri="{FF2B5EF4-FFF2-40B4-BE49-F238E27FC236}">
-                  <a16:creationId xmlns:a16="http://schemas.microsoft.com/office/drawing/2014/main" id="{891E56C9-ECCD-CEA1-3DBA-D8AEE127D6C2}"/>
-                </a:ext>
-              </a:extLst>
-            </p:cNvPr>
-            <p:cNvPicPr>
-              <a:picLocks noChangeAspect="1"/>
-            </p:cNvPicPr>
-            <p:nvPr/>
-          </p:nvPicPr>
-          <p:blipFill>
-            <a:blip r:embed="rId2"/>
-            <a:stretch>
-              <a:fillRect/>
-            </a:stretch>
-          </p:blipFill>
-          <p:spPr>
-            <a:xfrm>
-              <a:off x="83820" y="253238"/>
-              <a:ext cx="3959352" cy="3111408"/>
-            </a:xfrm>
-            <a:prstGeom prst="rect">
-              <a:avLst/>
-            </a:prstGeom>
-            <a:ln>
-              <a:solidFill>
-                <a:schemeClr val="tx1"/>
-              </a:solidFill>
-            </a:ln>
-          </p:spPr>
-        </p:pic>
-        <p:pic>
-          <p:nvPicPr>
-            <p:cNvPr id="8" name="Picture 7">
-              <a:extLst>
-                <a:ext uri="{FF2B5EF4-FFF2-40B4-BE49-F238E27FC236}">
-                  <a16:creationId xmlns:a16="http://schemas.microsoft.com/office/drawing/2014/main" id="{37087C2C-14C4-1BCD-0FF4-49D523D8F8E1}"/>
-                </a:ext>
-              </a:extLst>
-            </p:cNvPr>
-            <p:cNvPicPr>
-              <a:picLocks noChangeAspect="1"/>
-            </p:cNvPicPr>
-            <p:nvPr/>
-          </p:nvPicPr>
-          <p:blipFill>
-            <a:blip r:embed="rId3"/>
-            <a:stretch>
-              <a:fillRect/>
-            </a:stretch>
-          </p:blipFill>
-          <p:spPr>
-            <a:xfrm>
-              <a:off x="4116325" y="253238"/>
-              <a:ext cx="3959352" cy="3111408"/>
-            </a:xfrm>
-            <a:prstGeom prst="rect">
-              <a:avLst/>
-            </a:prstGeom>
-            <a:ln>
-              <a:solidFill>
-                <a:schemeClr val="tx1"/>
-              </a:solidFill>
-            </a:ln>
-          </p:spPr>
-        </p:pic>
-        <p:pic>
-          <p:nvPicPr>
-            <p:cNvPr id="11" name="Picture 10">
-              <a:extLst>
-                <a:ext uri="{FF2B5EF4-FFF2-40B4-BE49-F238E27FC236}">
-                  <a16:creationId xmlns:a16="http://schemas.microsoft.com/office/drawing/2014/main" id="{50003439-08A4-A864-7110-A4B6E4ECCDF5}"/>
-                </a:ext>
-              </a:extLst>
-            </p:cNvPr>
-            <p:cNvPicPr>
-              <a:picLocks noChangeAspect="1"/>
-            </p:cNvPicPr>
-            <p:nvPr/>
-          </p:nvPicPr>
-          <p:blipFill>
-            <a:blip r:embed="rId4"/>
-            <a:stretch>
-              <a:fillRect/>
-            </a:stretch>
-          </p:blipFill>
-          <p:spPr>
-            <a:xfrm>
-              <a:off x="8148830" y="253238"/>
-              <a:ext cx="3959352" cy="3111408"/>
-            </a:xfrm>
-            <a:prstGeom prst="rect">
-              <a:avLst/>
-            </a:prstGeom>
-            <a:ln>
-              <a:solidFill>
-                <a:schemeClr val="tx1"/>
-              </a:solidFill>
-            </a:ln>
-          </p:spPr>
-        </p:pic>
-      </p:grpSp>
-      <p:grpSp>
-        <p:nvGrpSpPr>
           <p:cNvPr id="37" name="Group 36">
             <a:extLst>
               <a:ext uri="{FF2B5EF4-FFF2-40B4-BE49-F238E27FC236}">
@@ -4516,7 +4390,7 @@
             <p:nvPr/>
           </p:nvPicPr>
           <p:blipFill>
-            <a:blip r:embed="rId5"/>
+            <a:blip r:embed="rId2"/>
             <a:stretch>
               <a:fillRect/>
             </a:stretch>
@@ -4551,7 +4425,7 @@
             <p:nvPr/>
           </p:nvPicPr>
           <p:blipFill>
-            <a:blip r:embed="rId6"/>
+            <a:blip r:embed="rId3"/>
             <a:stretch>
               <a:fillRect/>
             </a:stretch>
@@ -4586,7 +4460,7 @@
             <p:nvPr/>
           </p:nvPicPr>
           <p:blipFill>
-            <a:blip r:embed="rId7"/>
+            <a:blip r:embed="rId4"/>
             <a:stretch>
               <a:fillRect/>
             </a:stretch>
@@ -4595,6 +4469,132 @@
             <a:xfrm>
               <a:off x="8148830" y="1458707"/>
               <a:ext cx="3959352" cy="3240117"/>
+            </a:xfrm>
+            <a:prstGeom prst="rect">
+              <a:avLst/>
+            </a:prstGeom>
+            <a:ln>
+              <a:solidFill>
+                <a:schemeClr val="tx1"/>
+              </a:solidFill>
+            </a:ln>
+          </p:spPr>
+        </p:pic>
+      </p:grpSp>
+      <p:grpSp>
+        <p:nvGrpSpPr>
+          <p:cNvPr id="10" name="Group 9">
+            <a:extLst>
+              <a:ext uri="{FF2B5EF4-FFF2-40B4-BE49-F238E27FC236}">
+                <a16:creationId xmlns:a16="http://schemas.microsoft.com/office/drawing/2014/main" id="{5F112F64-A7B3-56D2-A298-B1FA170192FF}"/>
+              </a:ext>
+            </a:extLst>
+          </p:cNvPr>
+          <p:cNvGrpSpPr/>
+          <p:nvPr/>
+        </p:nvGrpSpPr>
+        <p:grpSpPr>
+          <a:xfrm>
+            <a:off x="83820" y="251742"/>
+            <a:ext cx="12024360" cy="3177258"/>
+            <a:chOff x="83820" y="251742"/>
+            <a:chExt cx="12024360" cy="3177258"/>
+          </a:xfrm>
+        </p:grpSpPr>
+        <p:pic>
+          <p:nvPicPr>
+            <p:cNvPr id="3" name="Picture 2">
+              <a:extLst>
+                <a:ext uri="{FF2B5EF4-FFF2-40B4-BE49-F238E27FC236}">
+                  <a16:creationId xmlns:a16="http://schemas.microsoft.com/office/drawing/2014/main" id="{F2144FDB-5A69-D115-D741-982E466890E1}"/>
+                </a:ext>
+              </a:extLst>
+            </p:cNvPr>
+            <p:cNvPicPr>
+              <a:picLocks noChangeAspect="1"/>
+            </p:cNvPicPr>
+            <p:nvPr/>
+          </p:nvPicPr>
+          <p:blipFill>
+            <a:blip r:embed="rId5"/>
+            <a:stretch>
+              <a:fillRect/>
+            </a:stretch>
+          </p:blipFill>
+          <p:spPr>
+            <a:xfrm>
+              <a:off x="83820" y="251742"/>
+              <a:ext cx="3959352" cy="3177256"/>
+            </a:xfrm>
+            <a:prstGeom prst="rect">
+              <a:avLst/>
+            </a:prstGeom>
+            <a:ln>
+              <a:solidFill>
+                <a:schemeClr val="tx1"/>
+              </a:solidFill>
+            </a:ln>
+          </p:spPr>
+        </p:pic>
+        <p:pic>
+          <p:nvPicPr>
+            <p:cNvPr id="5" name="Picture 4">
+              <a:extLst>
+                <a:ext uri="{FF2B5EF4-FFF2-40B4-BE49-F238E27FC236}">
+                  <a16:creationId xmlns:a16="http://schemas.microsoft.com/office/drawing/2014/main" id="{462F3167-58E4-5AE0-2A8F-CD488C376C0D}"/>
+                </a:ext>
+              </a:extLst>
+            </p:cNvPr>
+            <p:cNvPicPr>
+              <a:picLocks noChangeAspect="1"/>
+            </p:cNvPicPr>
+            <p:nvPr/>
+          </p:nvPicPr>
+          <p:blipFill>
+            <a:blip r:embed="rId6"/>
+            <a:stretch>
+              <a:fillRect/>
+            </a:stretch>
+          </p:blipFill>
+          <p:spPr>
+            <a:xfrm>
+              <a:off x="4116325" y="251742"/>
+              <a:ext cx="3959352" cy="3177258"/>
+            </a:xfrm>
+            <a:prstGeom prst="rect">
+              <a:avLst/>
+            </a:prstGeom>
+            <a:ln>
+              <a:solidFill>
+                <a:schemeClr val="tx1"/>
+              </a:solidFill>
+            </a:ln>
+          </p:spPr>
+        </p:pic>
+        <p:pic>
+          <p:nvPicPr>
+            <p:cNvPr id="9" name="Picture 8">
+              <a:extLst>
+                <a:ext uri="{FF2B5EF4-FFF2-40B4-BE49-F238E27FC236}">
+                  <a16:creationId xmlns:a16="http://schemas.microsoft.com/office/drawing/2014/main" id="{40F0A431-C673-27DB-6001-9195D2BB6A8E}"/>
+                </a:ext>
+              </a:extLst>
+            </p:cNvPr>
+            <p:cNvPicPr>
+              <a:picLocks noChangeAspect="1"/>
+            </p:cNvPicPr>
+            <p:nvPr/>
+          </p:nvPicPr>
+          <p:blipFill>
+            <a:blip r:embed="rId7"/>
+            <a:stretch>
+              <a:fillRect/>
+            </a:stretch>
+          </p:blipFill>
+          <p:spPr>
+            <a:xfrm>
+              <a:off x="8148828" y="251742"/>
+              <a:ext cx="3959352" cy="3177258"/>
             </a:xfrm>
             <a:prstGeom prst="rect">
               <a:avLst/>

</xml_diff>

<commit_message>
new 3pt historical plus (#64)
</commit_message>
<xml_diff>
--- a/data/basketballProject/reference-files/publishing-presentation.pptx
+++ b/data/basketballProject/reference-files/publishing-presentation.pptx
@@ -4357,132 +4357,6 @@
       </p:cxnSp>
       <p:grpSp>
         <p:nvGrpSpPr>
-          <p:cNvPr id="14" name="Group 13">
-            <a:extLst>
-              <a:ext uri="{FF2B5EF4-FFF2-40B4-BE49-F238E27FC236}">
-                <a16:creationId xmlns:a16="http://schemas.microsoft.com/office/drawing/2014/main" id="{EFBC766E-8BEE-A25E-09F6-0130BF61CC4D}"/>
-              </a:ext>
-            </a:extLst>
-          </p:cNvPr>
-          <p:cNvGrpSpPr/>
-          <p:nvPr/>
-        </p:nvGrpSpPr>
-        <p:grpSpPr>
-          <a:xfrm>
-            <a:off x="83820" y="253238"/>
-            <a:ext cx="12024362" cy="3111408"/>
-            <a:chOff x="83820" y="253238"/>
-            <a:chExt cx="12024362" cy="3111408"/>
-          </a:xfrm>
-        </p:grpSpPr>
-        <p:pic>
-          <p:nvPicPr>
-            <p:cNvPr id="6" name="Picture 5">
-              <a:extLst>
-                <a:ext uri="{FF2B5EF4-FFF2-40B4-BE49-F238E27FC236}">
-                  <a16:creationId xmlns:a16="http://schemas.microsoft.com/office/drawing/2014/main" id="{891E56C9-ECCD-CEA1-3DBA-D8AEE127D6C2}"/>
-                </a:ext>
-              </a:extLst>
-            </p:cNvPr>
-            <p:cNvPicPr>
-              <a:picLocks noChangeAspect="1"/>
-            </p:cNvPicPr>
-            <p:nvPr/>
-          </p:nvPicPr>
-          <p:blipFill>
-            <a:blip r:embed="rId2"/>
-            <a:stretch>
-              <a:fillRect/>
-            </a:stretch>
-          </p:blipFill>
-          <p:spPr>
-            <a:xfrm>
-              <a:off x="83820" y="253238"/>
-              <a:ext cx="3959352" cy="3111408"/>
-            </a:xfrm>
-            <a:prstGeom prst="rect">
-              <a:avLst/>
-            </a:prstGeom>
-            <a:ln>
-              <a:solidFill>
-                <a:schemeClr val="tx1"/>
-              </a:solidFill>
-            </a:ln>
-          </p:spPr>
-        </p:pic>
-        <p:pic>
-          <p:nvPicPr>
-            <p:cNvPr id="8" name="Picture 7">
-              <a:extLst>
-                <a:ext uri="{FF2B5EF4-FFF2-40B4-BE49-F238E27FC236}">
-                  <a16:creationId xmlns:a16="http://schemas.microsoft.com/office/drawing/2014/main" id="{37087C2C-14C4-1BCD-0FF4-49D523D8F8E1}"/>
-                </a:ext>
-              </a:extLst>
-            </p:cNvPr>
-            <p:cNvPicPr>
-              <a:picLocks noChangeAspect="1"/>
-            </p:cNvPicPr>
-            <p:nvPr/>
-          </p:nvPicPr>
-          <p:blipFill>
-            <a:blip r:embed="rId3"/>
-            <a:stretch>
-              <a:fillRect/>
-            </a:stretch>
-          </p:blipFill>
-          <p:spPr>
-            <a:xfrm>
-              <a:off x="4116325" y="253238"/>
-              <a:ext cx="3959352" cy="3111408"/>
-            </a:xfrm>
-            <a:prstGeom prst="rect">
-              <a:avLst/>
-            </a:prstGeom>
-            <a:ln>
-              <a:solidFill>
-                <a:schemeClr val="tx1"/>
-              </a:solidFill>
-            </a:ln>
-          </p:spPr>
-        </p:pic>
-        <p:pic>
-          <p:nvPicPr>
-            <p:cNvPr id="11" name="Picture 10">
-              <a:extLst>
-                <a:ext uri="{FF2B5EF4-FFF2-40B4-BE49-F238E27FC236}">
-                  <a16:creationId xmlns:a16="http://schemas.microsoft.com/office/drawing/2014/main" id="{50003439-08A4-A864-7110-A4B6E4ECCDF5}"/>
-                </a:ext>
-              </a:extLst>
-            </p:cNvPr>
-            <p:cNvPicPr>
-              <a:picLocks noChangeAspect="1"/>
-            </p:cNvPicPr>
-            <p:nvPr/>
-          </p:nvPicPr>
-          <p:blipFill>
-            <a:blip r:embed="rId4"/>
-            <a:stretch>
-              <a:fillRect/>
-            </a:stretch>
-          </p:blipFill>
-          <p:spPr>
-            <a:xfrm>
-              <a:off x="8148830" y="253238"/>
-              <a:ext cx="3959352" cy="3111408"/>
-            </a:xfrm>
-            <a:prstGeom prst="rect">
-              <a:avLst/>
-            </a:prstGeom>
-            <a:ln>
-              <a:solidFill>
-                <a:schemeClr val="tx1"/>
-              </a:solidFill>
-            </a:ln>
-          </p:spPr>
-        </p:pic>
-      </p:grpSp>
-      <p:grpSp>
-        <p:nvGrpSpPr>
           <p:cNvPr id="37" name="Group 36">
             <a:extLst>
               <a:ext uri="{FF2B5EF4-FFF2-40B4-BE49-F238E27FC236}">
@@ -4516,7 +4390,7 @@
             <p:nvPr/>
           </p:nvPicPr>
           <p:blipFill>
-            <a:blip r:embed="rId5"/>
+            <a:blip r:embed="rId2"/>
             <a:stretch>
               <a:fillRect/>
             </a:stretch>
@@ -4551,7 +4425,7 @@
             <p:nvPr/>
           </p:nvPicPr>
           <p:blipFill>
-            <a:blip r:embed="rId6"/>
+            <a:blip r:embed="rId3"/>
             <a:stretch>
               <a:fillRect/>
             </a:stretch>
@@ -4586,7 +4460,7 @@
             <p:nvPr/>
           </p:nvPicPr>
           <p:blipFill>
-            <a:blip r:embed="rId7"/>
+            <a:blip r:embed="rId4"/>
             <a:stretch>
               <a:fillRect/>
             </a:stretch>
@@ -4595,6 +4469,132 @@
             <a:xfrm>
               <a:off x="8148830" y="1458707"/>
               <a:ext cx="3959352" cy="3240117"/>
+            </a:xfrm>
+            <a:prstGeom prst="rect">
+              <a:avLst/>
+            </a:prstGeom>
+            <a:ln>
+              <a:solidFill>
+                <a:schemeClr val="tx1"/>
+              </a:solidFill>
+            </a:ln>
+          </p:spPr>
+        </p:pic>
+      </p:grpSp>
+      <p:grpSp>
+        <p:nvGrpSpPr>
+          <p:cNvPr id="10" name="Group 9">
+            <a:extLst>
+              <a:ext uri="{FF2B5EF4-FFF2-40B4-BE49-F238E27FC236}">
+                <a16:creationId xmlns:a16="http://schemas.microsoft.com/office/drawing/2014/main" id="{5F112F64-A7B3-56D2-A298-B1FA170192FF}"/>
+              </a:ext>
+            </a:extLst>
+          </p:cNvPr>
+          <p:cNvGrpSpPr/>
+          <p:nvPr/>
+        </p:nvGrpSpPr>
+        <p:grpSpPr>
+          <a:xfrm>
+            <a:off x="83820" y="251742"/>
+            <a:ext cx="12024360" cy="3177258"/>
+            <a:chOff x="83820" y="251742"/>
+            <a:chExt cx="12024360" cy="3177258"/>
+          </a:xfrm>
+        </p:grpSpPr>
+        <p:pic>
+          <p:nvPicPr>
+            <p:cNvPr id="3" name="Picture 2">
+              <a:extLst>
+                <a:ext uri="{FF2B5EF4-FFF2-40B4-BE49-F238E27FC236}">
+                  <a16:creationId xmlns:a16="http://schemas.microsoft.com/office/drawing/2014/main" id="{F2144FDB-5A69-D115-D741-982E466890E1}"/>
+                </a:ext>
+              </a:extLst>
+            </p:cNvPr>
+            <p:cNvPicPr>
+              <a:picLocks noChangeAspect="1"/>
+            </p:cNvPicPr>
+            <p:nvPr/>
+          </p:nvPicPr>
+          <p:blipFill>
+            <a:blip r:embed="rId5"/>
+            <a:stretch>
+              <a:fillRect/>
+            </a:stretch>
+          </p:blipFill>
+          <p:spPr>
+            <a:xfrm>
+              <a:off x="83820" y="251742"/>
+              <a:ext cx="3959352" cy="3177256"/>
+            </a:xfrm>
+            <a:prstGeom prst="rect">
+              <a:avLst/>
+            </a:prstGeom>
+            <a:ln>
+              <a:solidFill>
+                <a:schemeClr val="tx1"/>
+              </a:solidFill>
+            </a:ln>
+          </p:spPr>
+        </p:pic>
+        <p:pic>
+          <p:nvPicPr>
+            <p:cNvPr id="5" name="Picture 4">
+              <a:extLst>
+                <a:ext uri="{FF2B5EF4-FFF2-40B4-BE49-F238E27FC236}">
+                  <a16:creationId xmlns:a16="http://schemas.microsoft.com/office/drawing/2014/main" id="{462F3167-58E4-5AE0-2A8F-CD488C376C0D}"/>
+                </a:ext>
+              </a:extLst>
+            </p:cNvPr>
+            <p:cNvPicPr>
+              <a:picLocks noChangeAspect="1"/>
+            </p:cNvPicPr>
+            <p:nvPr/>
+          </p:nvPicPr>
+          <p:blipFill>
+            <a:blip r:embed="rId6"/>
+            <a:stretch>
+              <a:fillRect/>
+            </a:stretch>
+          </p:blipFill>
+          <p:spPr>
+            <a:xfrm>
+              <a:off x="4116325" y="251742"/>
+              <a:ext cx="3959352" cy="3177258"/>
+            </a:xfrm>
+            <a:prstGeom prst="rect">
+              <a:avLst/>
+            </a:prstGeom>
+            <a:ln>
+              <a:solidFill>
+                <a:schemeClr val="tx1"/>
+              </a:solidFill>
+            </a:ln>
+          </p:spPr>
+        </p:pic>
+        <p:pic>
+          <p:nvPicPr>
+            <p:cNvPr id="9" name="Picture 8">
+              <a:extLst>
+                <a:ext uri="{FF2B5EF4-FFF2-40B4-BE49-F238E27FC236}">
+                  <a16:creationId xmlns:a16="http://schemas.microsoft.com/office/drawing/2014/main" id="{40F0A431-C673-27DB-6001-9195D2BB6A8E}"/>
+                </a:ext>
+              </a:extLst>
+            </p:cNvPr>
+            <p:cNvPicPr>
+              <a:picLocks noChangeAspect="1"/>
+            </p:cNvPicPr>
+            <p:nvPr/>
+          </p:nvPicPr>
+          <p:blipFill>
+            <a:blip r:embed="rId7"/>
+            <a:stretch>
+              <a:fillRect/>
+            </a:stretch>
+          </p:blipFill>
+          <p:spPr>
+            <a:xfrm>
+              <a:off x="8148828" y="251742"/>
+              <a:ext cx="3959352" cy="3177258"/>
             </a:xfrm>
             <a:prstGeom prst="rect">
               <a:avLst/>

</xml_diff>